<commit_message>
removed absolute paths from commands, instead we define paths to tools and scripts in .bashrc
</commit_message>
<xml_diff>
--- a/ngsgu/cancergenomics/1610/slides/cancer_genomics.pptx
+++ b/ngsgu/cancergenomics/1610/slides/cancer_genomics.pptx
@@ -5,7 +5,7 @@
     <p:sldMasterId id="2147483841" r:id="rId1"/>
   </p:sldMasterIdLst>
   <p:notesMasterIdLst>
-    <p:notesMasterId r:id="rId43"/>
+    <p:notesMasterId r:id="rId42"/>
   </p:notesMasterIdLst>
   <p:sldIdLst>
     <p:sldId id="256" r:id="rId2"/>
@@ -21,34 +21,33 @@
     <p:sldId id="287" r:id="rId12"/>
     <p:sldId id="288" r:id="rId13"/>
     <p:sldId id="270" r:id="rId14"/>
-    <p:sldId id="291" r:id="rId15"/>
-    <p:sldId id="277" r:id="rId16"/>
-    <p:sldId id="283" r:id="rId17"/>
-    <p:sldId id="289" r:id="rId18"/>
-    <p:sldId id="297" r:id="rId19"/>
-    <p:sldId id="321" r:id="rId20"/>
-    <p:sldId id="322" r:id="rId21"/>
-    <p:sldId id="314" r:id="rId22"/>
-    <p:sldId id="317" r:id="rId23"/>
-    <p:sldId id="295" r:id="rId24"/>
-    <p:sldId id="318" r:id="rId25"/>
-    <p:sldId id="257" r:id="rId26"/>
-    <p:sldId id="298" r:id="rId27"/>
-    <p:sldId id="299" r:id="rId28"/>
-    <p:sldId id="304" r:id="rId29"/>
-    <p:sldId id="301" r:id="rId30"/>
-    <p:sldId id="303" r:id="rId31"/>
-    <p:sldId id="305" r:id="rId32"/>
-    <p:sldId id="306" r:id="rId33"/>
-    <p:sldId id="307" r:id="rId34"/>
-    <p:sldId id="308" r:id="rId35"/>
-    <p:sldId id="315" r:id="rId36"/>
-    <p:sldId id="316" r:id="rId37"/>
-    <p:sldId id="309" r:id="rId38"/>
-    <p:sldId id="310" r:id="rId39"/>
-    <p:sldId id="320" r:id="rId40"/>
-    <p:sldId id="311" r:id="rId41"/>
-    <p:sldId id="312" r:id="rId42"/>
+    <p:sldId id="277" r:id="rId15"/>
+    <p:sldId id="283" r:id="rId16"/>
+    <p:sldId id="289" r:id="rId17"/>
+    <p:sldId id="297" r:id="rId18"/>
+    <p:sldId id="321" r:id="rId19"/>
+    <p:sldId id="322" r:id="rId20"/>
+    <p:sldId id="314" r:id="rId21"/>
+    <p:sldId id="317" r:id="rId22"/>
+    <p:sldId id="295" r:id="rId23"/>
+    <p:sldId id="318" r:id="rId24"/>
+    <p:sldId id="257" r:id="rId25"/>
+    <p:sldId id="298" r:id="rId26"/>
+    <p:sldId id="299" r:id="rId27"/>
+    <p:sldId id="304" r:id="rId28"/>
+    <p:sldId id="301" r:id="rId29"/>
+    <p:sldId id="303" r:id="rId30"/>
+    <p:sldId id="305" r:id="rId31"/>
+    <p:sldId id="306" r:id="rId32"/>
+    <p:sldId id="307" r:id="rId33"/>
+    <p:sldId id="308" r:id="rId34"/>
+    <p:sldId id="315" r:id="rId35"/>
+    <p:sldId id="316" r:id="rId36"/>
+    <p:sldId id="309" r:id="rId37"/>
+    <p:sldId id="310" r:id="rId38"/>
+    <p:sldId id="320" r:id="rId39"/>
+    <p:sldId id="311" r:id="rId40"/>
+    <p:sldId id="312" r:id="rId41"/>
   </p:sldIdLst>
   <p:sldSz cx="9144000" cy="6858000" type="screen4x3"/>
   <p:notesSz cx="7010400" cy="9296400"/>
@@ -232,7 +231,7 @@
           <a:p>
             <a:fld id="{4DBCBD28-F41A-4E4D-A023-F37FB5E11D60}" type="datetimeFigureOut">
               <a:rPr lang="en-US" smtClean="0"/>
-              <a:t>19/10/16</a:t>
+              <a:t>25/10/16</a:t>
             </a:fld>
             <a:endParaRPr lang="en-US"/>
           </a:p>
@@ -1537,7 +1536,7 @@
           <a:p>
             <a:fld id="{497D469B-721A-4382-A9D0-D8D1FA5510BC}" type="slidenum">
               <a:rPr lang="sv-SE" smtClean="0"/>
-              <a:t>16</a:t>
+              <a:t>15</a:t>
             </a:fld>
             <a:endParaRPr lang="sv-SE"/>
           </a:p>
@@ -1663,7 +1662,7 @@
           <a:p>
             <a:fld id="{AB3A4CA0-194C-D041-A754-07EAE8CC2F9A}" type="slidenum">
               <a:rPr lang="en-US" smtClean="0"/>
-              <a:t>34</a:t>
+              <a:t>33</a:t>
             </a:fld>
             <a:endParaRPr lang="en-US"/>
           </a:p>
@@ -1788,7 +1787,7 @@
           <a:p>
             <a:fld id="{AB3A4CA0-194C-D041-A754-07EAE8CC2F9A}" type="slidenum">
               <a:rPr lang="en-US" smtClean="0"/>
-              <a:t>37</a:t>
+              <a:t>36</a:t>
             </a:fld>
             <a:endParaRPr lang="en-US"/>
           </a:p>
@@ -1989,7 +1988,7 @@
             <a:fld id="{6AD8D91A-A2EE-4B54-B3C6-F6C67903BA9C}" type="datetime1">
               <a:rPr lang="en-US" smtClean="0"/>
               <a:pPr/>
-              <a:t>19/10/16</a:t>
+              <a:t>25/10/16</a:t>
             </a:fld>
             <a:endParaRPr lang="en-US" dirty="0"/>
           </a:p>
@@ -2161,7 +2160,7 @@
             <a:fld id="{B19785C6-EBAF-49D5-AD4D-BABF4DFAAD59}" type="datetime1">
               <a:rPr lang="en-US" smtClean="0"/>
               <a:pPr/>
-              <a:t>19/10/16</a:t>
+              <a:t>25/10/16</a:t>
             </a:fld>
             <a:endParaRPr lang="en-US"/>
           </a:p>
@@ -2343,7 +2342,7 @@
             <a:fld id="{6A404122-9A3A-4FD8-98B8-22631F32846C}" type="datetime1">
               <a:rPr lang="en-US" smtClean="0"/>
               <a:pPr/>
-              <a:t>19/10/16</a:t>
+              <a:t>25/10/16</a:t>
             </a:fld>
             <a:endParaRPr lang="en-US" dirty="0"/>
           </a:p>
@@ -2515,7 +2514,7 @@
             <a:fld id="{C259A7B8-0EC4-44C9-AFEF-25E144F11C06}" type="datetime1">
               <a:rPr lang="en-US" smtClean="0"/>
               <a:pPr/>
-              <a:t>19/10/16</a:t>
+              <a:t>25/10/16</a:t>
             </a:fld>
             <a:endParaRPr lang="en-US"/>
           </a:p>
@@ -2763,7 +2762,7 @@
             <a:fld id="{82BB47B5-C739-4DAE-AACD-CC58CA843AC4}" type="datetime1">
               <a:rPr lang="en-US" smtClean="0"/>
               <a:pPr/>
-              <a:t>19/10/16</a:t>
+              <a:t>25/10/16</a:t>
             </a:fld>
             <a:endParaRPr lang="en-US" dirty="0"/>
           </a:p>
@@ -3053,7 +3052,7 @@
             <a:fld id="{3E72AE48-94E6-46E0-BE32-5F0716DE9115}" type="datetime1">
               <a:rPr lang="en-US" smtClean="0"/>
               <a:pPr/>
-              <a:t>19/10/16</a:t>
+              <a:t>25/10/16</a:t>
             </a:fld>
             <a:endParaRPr lang="en-US"/>
           </a:p>
@@ -3477,7 +3476,7 @@
             <a:fld id="{0884C285-8BCE-48FC-97D9-E2837AF38351}" type="datetime1">
               <a:rPr lang="en-US" smtClean="0"/>
               <a:pPr/>
-              <a:t>19/10/16</a:t>
+              <a:t>25/10/16</a:t>
             </a:fld>
             <a:endParaRPr lang="en-US"/>
           </a:p>
@@ -3597,7 +3596,7 @@
             <a:fld id="{0E70D3E6-EF16-4488-94A4-211508FE4682}" type="datetime1">
               <a:rPr lang="en-US" smtClean="0"/>
               <a:pPr/>
-              <a:t>19/10/16</a:t>
+              <a:t>25/10/16</a:t>
             </a:fld>
             <a:endParaRPr lang="en-US"/>
           </a:p>
@@ -3694,7 +3693,7 @@
             <a:fld id="{7077FB3B-20DA-4D0E-BF16-8262B7156612}" type="datetime1">
               <a:rPr lang="en-US" smtClean="0"/>
               <a:pPr/>
-              <a:t>19/10/16</a:t>
+              <a:t>25/10/16</a:t>
             </a:fld>
             <a:endParaRPr lang="en-US"/>
           </a:p>
@@ -3973,7 +3972,7 @@
             <a:fld id="{8C273C2C-6BD0-40EC-8D8D-4D51F089C5EB}" type="datetime1">
               <a:rPr lang="en-US" smtClean="0"/>
               <a:pPr/>
-              <a:t>19/10/16</a:t>
+              <a:t>25/10/16</a:t>
             </a:fld>
             <a:endParaRPr lang="en-US"/>
           </a:p>
@@ -4228,7 +4227,7 @@
             <a:fld id="{2D377F5C-EDA7-4864-9756-35769B0E62CF}" type="datetime1">
               <a:rPr lang="en-US" smtClean="0"/>
               <a:pPr/>
-              <a:t>19/10/16</a:t>
+              <a:t>25/10/16</a:t>
             </a:fld>
             <a:endParaRPr lang="en-US"/>
           </a:p>
@@ -4443,7 +4442,7 @@
             <a:fld id="{88B99C93-F56F-46AB-9EB8-53614A95B15F}" type="datetime1">
               <a:rPr lang="en-US" smtClean="0"/>
               <a:pPr/>
-              <a:t>19/10/16</a:t>
+              <a:t>25/10/16</a:t>
             </a:fld>
             <a:endParaRPr lang="en-US" dirty="0"/>
           </a:p>
@@ -5425,111 +5424,6 @@
 </file>
 
 <file path=ppt/slides/slide14.xml><?xml version="1.0" encoding="utf-8"?>
-<p:sld xmlns:a="http://schemas.openxmlformats.org/drawingml/2006/main" xmlns:r="http://schemas.openxmlformats.org/officeDocument/2006/relationships" xmlns:p="http://schemas.openxmlformats.org/presentationml/2006/main">
-  <p:cSld>
-    <p:spTree>
-      <p:nvGrpSpPr>
-        <p:cNvPr id="1" name=""/>
-        <p:cNvGrpSpPr/>
-        <p:nvPr/>
-      </p:nvGrpSpPr>
-      <p:grpSpPr>
-        <a:xfrm>
-          <a:off x="0" y="0"/>
-          <a:ext cx="0" cy="0"/>
-          <a:chOff x="0" y="0"/>
-          <a:chExt cx="0" cy="0"/>
-        </a:xfrm>
-      </p:grpSpPr>
-      <p:sp>
-        <p:nvSpPr>
-          <p:cNvPr id="2" name="Title 1"/>
-          <p:cNvSpPr>
-            <a:spLocks noGrp="1"/>
-          </p:cNvSpPr>
-          <p:nvPr>
-            <p:ph type="title"/>
-          </p:nvPr>
-        </p:nvSpPr>
-        <p:spPr/>
-        <p:txBody>
-          <a:bodyPr/>
-          <a:lstStyle/>
-          <a:p>
-            <a:r>
-              <a:rPr lang="en-US" dirty="0" smtClean="0"/>
-              <a:t>Massively parallel sequencing</a:t>
-            </a:r>
-            <a:endParaRPr lang="en-US" dirty="0"/>
-          </a:p>
-        </p:txBody>
-      </p:sp>
-      <p:sp>
-        <p:nvSpPr>
-          <p:cNvPr id="3" name="Content Placeholder 2"/>
-          <p:cNvSpPr>
-            <a:spLocks noGrp="1"/>
-          </p:cNvSpPr>
-          <p:nvPr>
-            <p:ph idx="1"/>
-          </p:nvPr>
-        </p:nvSpPr>
-        <p:spPr>
-          <a:xfrm>
-            <a:off x="1535220" y="2082450"/>
-            <a:ext cx="7008960" cy="3383052"/>
-          </a:xfrm>
-        </p:spPr>
-        <p:txBody>
-          <a:bodyPr/>
-          <a:lstStyle/>
-          <a:p>
-            <a:r>
-              <a:rPr lang="en-US" dirty="0" smtClean="0"/>
-              <a:t>Whole genome sequencing</a:t>
-            </a:r>
-          </a:p>
-          <a:p>
-            <a:r>
-              <a:rPr lang="en-US" dirty="0" err="1" smtClean="0"/>
-              <a:t>Exome</a:t>
-            </a:r>
-            <a:r>
-              <a:rPr lang="en-US" dirty="0" smtClean="0"/>
-              <a:t> sequencing</a:t>
-            </a:r>
-            <a:endParaRPr lang="en-US" dirty="0"/>
-          </a:p>
-          <a:p>
-            <a:r>
-              <a:rPr lang="en-US" dirty="0" smtClean="0"/>
-              <a:t>Hundreds of tumors analyzed in parallel</a:t>
-            </a:r>
-            <a:endParaRPr lang="en-US" dirty="0"/>
-          </a:p>
-        </p:txBody>
-      </p:sp>
-    </p:spTree>
-    <p:extLst>
-      <p:ext uri="{BB962C8B-B14F-4D97-AF65-F5344CB8AC3E}">
-        <p14:creationId xmlns:p14="http://schemas.microsoft.com/office/powerpoint/2010/main" val="409632556"/>
-      </p:ext>
-    </p:extLst>
-  </p:cSld>
-  <p:clrMapOvr>
-    <a:masterClrMapping/>
-  </p:clrMapOvr>
-  <p:timing>
-    <p:tnLst>
-      <p:par>
-        <p:cTn xmlns:p14="http://schemas.microsoft.com/office/powerpoint/2010/main" id="1" dur="indefinite" restart="never" nodeType="tmRoot"/>
-      </p:par>
-    </p:tnLst>
-  </p:timing>
-</p:sld>
-</file>
-
-<file path=ppt/slides/slide15.xml><?xml version="1.0" encoding="utf-8"?>
 <p:sld xmlns:a="http://schemas.openxmlformats.org/drawingml/2006/main" xmlns:r="http://schemas.openxmlformats.org/officeDocument/2006/relationships" xmlns:p="http://schemas.openxmlformats.org/presentationml/2006/main">
   <p:cSld>
     <p:spTree>
@@ -6635,7 +6529,7 @@
 </p:sld>
 </file>
 
-<file path=ppt/slides/slide16.xml><?xml version="1.0" encoding="utf-8"?>
+<file path=ppt/slides/slide15.xml><?xml version="1.0" encoding="utf-8"?>
 <p:sld xmlns:a="http://schemas.openxmlformats.org/drawingml/2006/main" xmlns:r="http://schemas.openxmlformats.org/officeDocument/2006/relationships" xmlns:p="http://schemas.openxmlformats.org/presentationml/2006/main">
   <p:cSld>
     <p:spTree>
@@ -7162,7 +7056,7 @@
 </p:sld>
 </file>
 
-<file path=ppt/slides/slide17.xml><?xml version="1.0" encoding="utf-8"?>
+<file path=ppt/slides/slide16.xml><?xml version="1.0" encoding="utf-8"?>
 <p:sld xmlns:a="http://schemas.openxmlformats.org/drawingml/2006/main" xmlns:r="http://schemas.openxmlformats.org/officeDocument/2006/relationships" xmlns:p="http://schemas.openxmlformats.org/presentationml/2006/main">
   <p:cSld>
     <p:spTree>
@@ -7227,7 +7121,7 @@
 </p:sld>
 </file>
 
-<file path=ppt/slides/slide18.xml><?xml version="1.0" encoding="utf-8"?>
+<file path=ppt/slides/slide17.xml><?xml version="1.0" encoding="utf-8"?>
 <p:sld xmlns:a="http://schemas.openxmlformats.org/drawingml/2006/main" xmlns:r="http://schemas.openxmlformats.org/officeDocument/2006/relationships" xmlns:p="http://schemas.openxmlformats.org/presentationml/2006/main">
   <p:cSld>
     <p:spTree>
@@ -7312,7 +7206,7 @@
             <a:fld id="{EF15D6EA-EBF7-4C2E-A1CC-C279B7E6D53A}" type="slidenum">
               <a:rPr lang="en-GB" smtClean="0"/>
               <a:pPr/>
-              <a:t>18</a:t>
+              <a:t>17</a:t>
             </a:fld>
             <a:endParaRPr lang="en-GB" dirty="0"/>
           </a:p>
@@ -7594,7 +7488,7 @@
 </p:sld>
 </file>
 
-<file path=ppt/slides/slide19.xml><?xml version="1.0" encoding="utf-8"?>
+<file path=ppt/slides/slide18.xml><?xml version="1.0" encoding="utf-8"?>
 <p:sld xmlns:a="http://schemas.openxmlformats.org/drawingml/2006/main" xmlns:r="http://schemas.openxmlformats.org/officeDocument/2006/relationships" xmlns:p="http://schemas.openxmlformats.org/presentationml/2006/main">
   <p:cSld>
     <p:spTree>
@@ -7718,140 +7612,7 @@
 </p:sld>
 </file>
 
-<file path=ppt/slides/slide2.xml><?xml version="1.0" encoding="utf-8"?>
-<p:sld xmlns:a="http://schemas.openxmlformats.org/drawingml/2006/main" xmlns:r="http://schemas.openxmlformats.org/officeDocument/2006/relationships" xmlns:p="http://schemas.openxmlformats.org/presentationml/2006/main">
-  <p:cSld>
-    <p:spTree>
-      <p:nvGrpSpPr>
-        <p:cNvPr id="1" name=""/>
-        <p:cNvGrpSpPr/>
-        <p:nvPr/>
-      </p:nvGrpSpPr>
-      <p:grpSpPr>
-        <a:xfrm>
-          <a:off x="0" y="0"/>
-          <a:ext cx="0" cy="0"/>
-          <a:chOff x="0" y="0"/>
-          <a:chExt cx="0" cy="0"/>
-        </a:xfrm>
-      </p:grpSpPr>
-      <p:sp>
-        <p:nvSpPr>
-          <p:cNvPr id="2" name="Title 1"/>
-          <p:cNvSpPr>
-            <a:spLocks noGrp="1"/>
-          </p:cNvSpPr>
-          <p:nvPr>
-            <p:ph type="title"/>
-          </p:nvPr>
-        </p:nvSpPr>
-        <p:spPr/>
-        <p:txBody>
-          <a:bodyPr/>
-          <a:lstStyle/>
-          <a:p>
-            <a:r>
-              <a:rPr lang="en-US" dirty="0" smtClean="0"/>
-              <a:t>Outline</a:t>
-            </a:r>
-            <a:endParaRPr lang="en-US" dirty="0"/>
-          </a:p>
-        </p:txBody>
-      </p:sp>
-      <p:sp>
-        <p:nvSpPr>
-          <p:cNvPr id="3" name="Content Placeholder 2"/>
-          <p:cNvSpPr>
-            <a:spLocks noGrp="1"/>
-          </p:cNvSpPr>
-          <p:nvPr>
-            <p:ph idx="1"/>
-          </p:nvPr>
-        </p:nvSpPr>
-        <p:spPr>
-          <a:xfrm>
-            <a:off x="1099985" y="1585369"/>
-            <a:ext cx="7287568" cy="4525963"/>
-          </a:xfrm>
-        </p:spPr>
-        <p:txBody>
-          <a:bodyPr/>
-          <a:lstStyle/>
-          <a:p>
-            <a:r>
-              <a:rPr lang="en-US" dirty="0" smtClean="0"/>
-              <a:t>Introduction </a:t>
-            </a:r>
-          </a:p>
-          <a:p>
-            <a:r>
-              <a:rPr lang="en-US" dirty="0" smtClean="0"/>
-              <a:t>The mutational landscape of cancer</a:t>
-            </a:r>
-          </a:p>
-          <a:p>
-            <a:r>
-              <a:rPr lang="en-US" dirty="0" smtClean="0"/>
-              <a:t>Detection of cancer mutations</a:t>
-            </a:r>
-          </a:p>
-          <a:p>
-            <a:r>
-              <a:rPr lang="en-US" dirty="0"/>
-              <a:t>recap of </a:t>
-            </a:r>
-            <a:r>
-              <a:rPr lang="en-US" dirty="0" err="1"/>
-              <a:t>germline</a:t>
-            </a:r>
-            <a:r>
-              <a:rPr lang="en-US" dirty="0"/>
-              <a:t> variant </a:t>
-            </a:r>
-            <a:r>
-              <a:rPr lang="en-US" dirty="0" smtClean="0"/>
-              <a:t>calling</a:t>
-            </a:r>
-          </a:p>
-          <a:p>
-            <a:r>
-              <a:rPr lang="en-US" dirty="0"/>
-              <a:t>Somatic variant calling </a:t>
-            </a:r>
-            <a:r>
-              <a:rPr lang="en-US" dirty="0" smtClean="0"/>
-              <a:t>workflow</a:t>
-            </a:r>
-          </a:p>
-          <a:p>
-            <a:r>
-              <a:rPr lang="en-US" dirty="0" smtClean="0"/>
-              <a:t>Today’s practical</a:t>
-            </a:r>
-          </a:p>
-        </p:txBody>
-      </p:sp>
-    </p:spTree>
-    <p:extLst>
-      <p:ext uri="{BB962C8B-B14F-4D97-AF65-F5344CB8AC3E}">
-        <p14:creationId xmlns:p14="http://schemas.microsoft.com/office/powerpoint/2010/main" val="2166565773"/>
-      </p:ext>
-    </p:extLst>
-  </p:cSld>
-  <p:clrMapOvr>
-    <a:masterClrMapping/>
-  </p:clrMapOvr>
-  <p:timing>
-    <p:tnLst>
-      <p:par>
-        <p:cTn xmlns:p14="http://schemas.microsoft.com/office/powerpoint/2010/main" id="1" dur="indefinite" restart="never" nodeType="tmRoot"/>
-      </p:par>
-    </p:tnLst>
-  </p:timing>
-</p:sld>
-</file>
-
-<file path=ppt/slides/slide20.xml><?xml version="1.0" encoding="utf-8"?>
+<file path=ppt/slides/slide19.xml><?xml version="1.0" encoding="utf-8"?>
 <p:sld xmlns:a="http://schemas.openxmlformats.org/drawingml/2006/main" xmlns:r="http://schemas.openxmlformats.org/officeDocument/2006/relationships" xmlns:p="http://schemas.openxmlformats.org/presentationml/2006/main">
   <p:cSld>
     <p:spTree>
@@ -7937,7 +7698,140 @@
 </p:sld>
 </file>
 
-<file path=ppt/slides/slide21.xml><?xml version="1.0" encoding="utf-8"?>
+<file path=ppt/slides/slide2.xml><?xml version="1.0" encoding="utf-8"?>
+<p:sld xmlns:a="http://schemas.openxmlformats.org/drawingml/2006/main" xmlns:r="http://schemas.openxmlformats.org/officeDocument/2006/relationships" xmlns:p="http://schemas.openxmlformats.org/presentationml/2006/main">
+  <p:cSld>
+    <p:spTree>
+      <p:nvGrpSpPr>
+        <p:cNvPr id="1" name=""/>
+        <p:cNvGrpSpPr/>
+        <p:nvPr/>
+      </p:nvGrpSpPr>
+      <p:grpSpPr>
+        <a:xfrm>
+          <a:off x="0" y="0"/>
+          <a:ext cx="0" cy="0"/>
+          <a:chOff x="0" y="0"/>
+          <a:chExt cx="0" cy="0"/>
+        </a:xfrm>
+      </p:grpSpPr>
+      <p:sp>
+        <p:nvSpPr>
+          <p:cNvPr id="2" name="Title 1"/>
+          <p:cNvSpPr>
+            <a:spLocks noGrp="1"/>
+          </p:cNvSpPr>
+          <p:nvPr>
+            <p:ph type="title"/>
+          </p:nvPr>
+        </p:nvSpPr>
+        <p:spPr/>
+        <p:txBody>
+          <a:bodyPr/>
+          <a:lstStyle/>
+          <a:p>
+            <a:r>
+              <a:rPr lang="en-US" dirty="0" smtClean="0"/>
+              <a:t>Outline</a:t>
+            </a:r>
+            <a:endParaRPr lang="en-US" dirty="0"/>
+          </a:p>
+        </p:txBody>
+      </p:sp>
+      <p:sp>
+        <p:nvSpPr>
+          <p:cNvPr id="3" name="Content Placeholder 2"/>
+          <p:cNvSpPr>
+            <a:spLocks noGrp="1"/>
+          </p:cNvSpPr>
+          <p:nvPr>
+            <p:ph idx="1"/>
+          </p:nvPr>
+        </p:nvSpPr>
+        <p:spPr>
+          <a:xfrm>
+            <a:off x="1099985" y="1585369"/>
+            <a:ext cx="7287568" cy="4525963"/>
+          </a:xfrm>
+        </p:spPr>
+        <p:txBody>
+          <a:bodyPr/>
+          <a:lstStyle/>
+          <a:p>
+            <a:r>
+              <a:rPr lang="en-US" dirty="0" smtClean="0"/>
+              <a:t>Introduction </a:t>
+            </a:r>
+          </a:p>
+          <a:p>
+            <a:r>
+              <a:rPr lang="en-US" dirty="0" smtClean="0"/>
+              <a:t>The mutational landscape of cancer</a:t>
+            </a:r>
+          </a:p>
+          <a:p>
+            <a:r>
+              <a:rPr lang="en-US" dirty="0" smtClean="0"/>
+              <a:t>Detection of cancer mutations</a:t>
+            </a:r>
+          </a:p>
+          <a:p>
+            <a:r>
+              <a:rPr lang="en-US" dirty="0"/>
+              <a:t>recap of </a:t>
+            </a:r>
+            <a:r>
+              <a:rPr lang="en-US" dirty="0" err="1"/>
+              <a:t>germline</a:t>
+            </a:r>
+            <a:r>
+              <a:rPr lang="en-US" dirty="0"/>
+              <a:t> variant </a:t>
+            </a:r>
+            <a:r>
+              <a:rPr lang="en-US" dirty="0" smtClean="0"/>
+              <a:t>calling</a:t>
+            </a:r>
+          </a:p>
+          <a:p>
+            <a:r>
+              <a:rPr lang="en-US" dirty="0"/>
+              <a:t>Somatic variant calling </a:t>
+            </a:r>
+            <a:r>
+              <a:rPr lang="en-US" dirty="0" smtClean="0"/>
+              <a:t>workflow</a:t>
+            </a:r>
+          </a:p>
+          <a:p>
+            <a:r>
+              <a:rPr lang="en-US" dirty="0" smtClean="0"/>
+              <a:t>Today’s practical</a:t>
+            </a:r>
+          </a:p>
+        </p:txBody>
+      </p:sp>
+    </p:spTree>
+    <p:extLst>
+      <p:ext uri="{BB962C8B-B14F-4D97-AF65-F5344CB8AC3E}">
+        <p14:creationId xmlns:p14="http://schemas.microsoft.com/office/powerpoint/2010/main" val="2166565773"/>
+      </p:ext>
+    </p:extLst>
+  </p:cSld>
+  <p:clrMapOvr>
+    <a:masterClrMapping/>
+  </p:clrMapOvr>
+  <p:timing>
+    <p:tnLst>
+      <p:par>
+        <p:cTn xmlns:p14="http://schemas.microsoft.com/office/powerpoint/2010/main" id="1" dur="indefinite" restart="never" nodeType="tmRoot"/>
+      </p:par>
+    </p:tnLst>
+  </p:timing>
+</p:sld>
+</file>
+
+<file path=ppt/slides/slide20.xml><?xml version="1.0" encoding="utf-8"?>
 <p:sld xmlns:a="http://schemas.openxmlformats.org/drawingml/2006/main" xmlns:r="http://schemas.openxmlformats.org/officeDocument/2006/relationships" xmlns:p="http://schemas.openxmlformats.org/presentationml/2006/main">
   <p:cSld>
     <p:spTree>
@@ -8098,7 +7992,7 @@
 </p:sld>
 </file>
 
-<file path=ppt/slides/slide22.xml><?xml version="1.0" encoding="utf-8"?>
+<file path=ppt/slides/slide21.xml><?xml version="1.0" encoding="utf-8"?>
 <p:sld xmlns:a="http://schemas.openxmlformats.org/drawingml/2006/main" xmlns:r="http://schemas.openxmlformats.org/officeDocument/2006/relationships" xmlns:p="http://schemas.openxmlformats.org/presentationml/2006/main">
   <p:cSld>
     <p:spTree>
@@ -8152,6 +8046,182 @@
     <p:extLst>
       <p:ext uri="{BB962C8B-B14F-4D97-AF65-F5344CB8AC3E}">
         <p14:creationId xmlns:p14="http://schemas.microsoft.com/office/powerpoint/2010/main" val="3264216187"/>
+      </p:ext>
+    </p:extLst>
+  </p:cSld>
+  <p:clrMapOvr>
+    <a:masterClrMapping/>
+  </p:clrMapOvr>
+  <p:timing>
+    <p:tnLst>
+      <p:par>
+        <p:cTn xmlns:p14="http://schemas.microsoft.com/office/powerpoint/2010/main" id="1" dur="indefinite" restart="never" nodeType="tmRoot"/>
+      </p:par>
+    </p:tnLst>
+  </p:timing>
+</p:sld>
+</file>
+
+<file path=ppt/slides/slide22.xml><?xml version="1.0" encoding="utf-8"?>
+<p:sld xmlns:a="http://schemas.openxmlformats.org/drawingml/2006/main" xmlns:r="http://schemas.openxmlformats.org/officeDocument/2006/relationships" xmlns:p="http://schemas.openxmlformats.org/presentationml/2006/main">
+  <p:cSld>
+    <p:spTree>
+      <p:nvGrpSpPr>
+        <p:cNvPr id="1" name=""/>
+        <p:cNvGrpSpPr/>
+        <p:nvPr/>
+      </p:nvGrpSpPr>
+      <p:grpSpPr>
+        <a:xfrm>
+          <a:off x="0" y="0"/>
+          <a:ext cx="0" cy="0"/>
+          <a:chOff x="0" y="0"/>
+          <a:chExt cx="0" cy="0"/>
+        </a:xfrm>
+      </p:grpSpPr>
+      <p:sp>
+        <p:nvSpPr>
+          <p:cNvPr id="2" name="Title 1"/>
+          <p:cNvSpPr>
+            <a:spLocks noGrp="1"/>
+          </p:cNvSpPr>
+          <p:nvPr>
+            <p:ph type="title"/>
+          </p:nvPr>
+        </p:nvSpPr>
+        <p:spPr/>
+        <p:txBody>
+          <a:bodyPr/>
+          <a:lstStyle/>
+          <a:p>
+            <a:r>
+              <a:rPr lang="en-US" dirty="0" smtClean="0"/>
+              <a:t>Many tools available</a:t>
+            </a:r>
+            <a:endParaRPr lang="en-US" dirty="0"/>
+          </a:p>
+        </p:txBody>
+      </p:sp>
+      <p:sp>
+        <p:nvSpPr>
+          <p:cNvPr id="3" name="Content Placeholder 2"/>
+          <p:cNvSpPr>
+            <a:spLocks noGrp="1"/>
+          </p:cNvSpPr>
+          <p:nvPr>
+            <p:ph idx="1"/>
+          </p:nvPr>
+        </p:nvSpPr>
+        <p:spPr>
+          <a:xfrm>
+            <a:off x="1390540" y="1696650"/>
+            <a:ext cx="7169716" cy="4525963"/>
+          </a:xfrm>
+        </p:spPr>
+        <p:txBody>
+          <a:bodyPr>
+            <a:normAutofit lnSpcReduction="10000"/>
+          </a:bodyPr>
+          <a:lstStyle/>
+          <a:p>
+            <a:r>
+              <a:rPr lang="en-US" dirty="0"/>
+              <a:t>single nucleotide variants (SNVs)</a:t>
+            </a:r>
+          </a:p>
+          <a:p>
+            <a:pPr marL="0" indent="0">
+              <a:buNone/>
+            </a:pPr>
+            <a:r>
+              <a:rPr lang="en-US" dirty="0"/>
+              <a:t>	</a:t>
+            </a:r>
+            <a:r>
+              <a:rPr lang="en-US" dirty="0" smtClean="0"/>
+              <a:t>MuTect1, </a:t>
+            </a:r>
+            <a:r>
+              <a:rPr lang="en-US" dirty="0" err="1" smtClean="0"/>
+              <a:t>Strelka</a:t>
+            </a:r>
+            <a:r>
+              <a:rPr lang="en-US" dirty="0" smtClean="0"/>
+              <a:t>, MuTect2</a:t>
+            </a:r>
+          </a:p>
+          <a:p>
+            <a:pPr marL="0" indent="0">
+              <a:buNone/>
+            </a:pPr>
+            <a:endParaRPr lang="en-US" dirty="0"/>
+          </a:p>
+          <a:p>
+            <a:r>
+              <a:rPr lang="en-US" dirty="0"/>
+              <a:t>structural variants (SVs) </a:t>
+            </a:r>
+          </a:p>
+          <a:p>
+            <a:pPr marL="0" indent="0">
+              <a:buNone/>
+            </a:pPr>
+            <a:r>
+              <a:rPr lang="en-US" dirty="0"/>
+              <a:t>	</a:t>
+            </a:r>
+            <a:r>
+              <a:rPr lang="en-US" dirty="0" smtClean="0"/>
+              <a:t>Manta, </a:t>
+            </a:r>
+            <a:r>
+              <a:rPr lang="en-US" dirty="0" err="1" smtClean="0"/>
+              <a:t>Delly</a:t>
+            </a:r>
+            <a:endParaRPr lang="en-US" dirty="0" smtClean="0"/>
+          </a:p>
+          <a:p>
+            <a:pPr marL="0" indent="0">
+              <a:buNone/>
+            </a:pPr>
+            <a:endParaRPr lang="en-US" dirty="0"/>
+          </a:p>
+          <a:p>
+            <a:r>
+              <a:rPr lang="en-US" dirty="0" smtClean="0"/>
+              <a:t>copy </a:t>
+            </a:r>
+            <a:r>
+              <a:rPr lang="en-US" dirty="0"/>
+              <a:t>number variants (CNVs)</a:t>
+            </a:r>
+          </a:p>
+          <a:p>
+            <a:pPr marL="0" indent="0">
+              <a:buNone/>
+            </a:pPr>
+            <a:r>
+              <a:rPr lang="en-US" dirty="0"/>
+              <a:t>	</a:t>
+            </a:r>
+            <a:r>
+              <a:rPr lang="en-US" dirty="0" smtClean="0"/>
+              <a:t>ASCAT, Patchwork, FACETS</a:t>
+            </a:r>
+            <a:endParaRPr lang="en-US" dirty="0"/>
+          </a:p>
+          <a:p>
+            <a:pPr marL="0" indent="0">
+              <a:buNone/>
+            </a:pPr>
+            <a:endParaRPr lang="en-US" dirty="0"/>
+          </a:p>
+        </p:txBody>
+      </p:sp>
+    </p:spTree>
+    <p:extLst>
+      <p:ext uri="{BB962C8B-B14F-4D97-AF65-F5344CB8AC3E}">
+        <p14:creationId xmlns:p14="http://schemas.microsoft.com/office/powerpoint/2010/main" val="2719668052"/>
       </p:ext>
     </p:extLst>
   </p:cSld>
@@ -8202,7 +8272,7 @@
           <a:p>
             <a:r>
               <a:rPr lang="en-US" dirty="0" smtClean="0"/>
-              <a:t>Many tools available</a:t>
+              <a:t>Keep updated!</a:t>
             </a:r>
             <a:endParaRPr lang="en-US" dirty="0"/>
           </a:p>
@@ -8220,106 +8290,76 @@
         </p:nvSpPr>
         <p:spPr>
           <a:xfrm>
-            <a:off x="1390540" y="1696650"/>
-            <a:ext cx="7169716" cy="4525963"/>
+            <a:off x="1003300" y="1587500"/>
+            <a:ext cx="7683500" cy="4525963"/>
           </a:xfrm>
         </p:spPr>
         <p:txBody>
-          <a:bodyPr>
-            <a:normAutofit lnSpcReduction="10000"/>
-          </a:bodyPr>
+          <a:bodyPr/>
           <a:lstStyle/>
-          <a:p>
-            <a:r>
-              <a:rPr lang="en-US" dirty="0"/>
-              <a:t>single nucleotide variants (SNVs)</a:t>
-            </a:r>
-          </a:p>
           <a:p>
             <a:pPr marL="0" indent="0">
               <a:buNone/>
             </a:pPr>
             <a:r>
-              <a:rPr lang="en-US" dirty="0"/>
-              <a:t>	</a:t>
+              <a:rPr lang="en-US" dirty="0" err="1" smtClean="0"/>
+              <a:t>SciLifeLab</a:t>
             </a:r>
             <a:r>
               <a:rPr lang="en-US" dirty="0" smtClean="0"/>
-              <a:t>MuTect1, </a:t>
-            </a:r>
-            <a:r>
-              <a:rPr lang="en-US" dirty="0" err="1" smtClean="0"/>
-              <a:t>Strelka</a:t>
-            </a:r>
-            <a:r>
-              <a:rPr lang="en-US" dirty="0" smtClean="0"/>
-              <a:t>, MuTect2</a:t>
+              <a:t> WGS toolbox group:</a:t>
             </a:r>
           </a:p>
           <a:p>
             <a:pPr marL="0" indent="0">
               <a:buNone/>
             </a:pPr>
+            <a:r>
+              <a:rPr lang="en-US" dirty="0" smtClean="0">
+                <a:hlinkClick r:id="rId2"/>
+              </a:rPr>
+              <a:t>https</a:t>
+            </a:r>
+            <a:r>
+              <a:rPr lang="en-US" dirty="0">
+                <a:hlinkClick r:id="rId2"/>
+              </a:rPr>
+              <a:t>://</a:t>
+            </a:r>
+            <a:r>
+              <a:rPr lang="en-US" dirty="0" err="1">
+                <a:hlinkClick r:id="rId2"/>
+              </a:rPr>
+              <a:t>wabi-wiki.scilifelab.se</a:t>
+            </a:r>
+            <a:r>
+              <a:rPr lang="en-US" dirty="0">
+                <a:hlinkClick r:id="rId2"/>
+              </a:rPr>
+              <a:t>/display/SHGATG/</a:t>
+            </a:r>
+            <a:r>
+              <a:rPr lang="en-US" dirty="0" err="1">
+                <a:hlinkClick r:id="rId2"/>
+              </a:rPr>
+              <a:t>SciLifeLab+human+genome+analysis+toolbox+group</a:t>
+            </a:r>
             <a:endParaRPr lang="en-US" dirty="0"/>
-          </a:p>
-          <a:p>
-            <a:r>
-              <a:rPr lang="en-US" dirty="0"/>
-              <a:t>structural variants (SVs) </a:t>
-            </a:r>
           </a:p>
           <a:p>
             <a:pPr marL="0" indent="0">
               <a:buNone/>
             </a:pPr>
-            <a:r>
-              <a:rPr lang="en-US" dirty="0"/>
-              <a:t>	</a:t>
-            </a:r>
-            <a:r>
-              <a:rPr lang="en-US" dirty="0" smtClean="0"/>
-              <a:t>Manta, </a:t>
-            </a:r>
-            <a:r>
-              <a:rPr lang="en-US" dirty="0" err="1" smtClean="0"/>
-              <a:t>Delly</a:t>
-            </a:r>
             <a:endParaRPr lang="en-US" dirty="0" smtClean="0"/>
           </a:p>
           <a:p>
             <a:pPr marL="0" indent="0">
               <a:buNone/>
             </a:pPr>
-            <a:endParaRPr lang="en-US" dirty="0"/>
-          </a:p>
-          <a:p>
             <a:r>
               <a:rPr lang="en-US" dirty="0" smtClean="0"/>
-              <a:t>copy </a:t>
-            </a:r>
-            <a:r>
-              <a:rPr lang="en-US" dirty="0"/>
-              <a:t>number variants (CNVs)</a:t>
-            </a:r>
-          </a:p>
-          <a:p>
-            <a:pPr marL="0" indent="0">
-              <a:buNone/>
-            </a:pPr>
-            <a:r>
-              <a:rPr lang="en-US" dirty="0"/>
-              <a:t>	</a:t>
-            </a:r>
-            <a:r>
-              <a:rPr lang="en-US" dirty="0" smtClean="0"/>
-              <a:t>ASCAT, Patchwork, FACETS</a:t>
-            </a:r>
-            <a:endParaRPr lang="en-US" dirty="0"/>
-          </a:p>
-          <a:p>
-            <a:pPr marL="0" indent="0">
-              <a:buNone/>
-            </a:pPr>
+              <a:t>Recommended tools and workflow for somatic variant calling (and other things)</a:t>
+            </a:r>
             <a:endParaRPr lang="en-US" dirty="0"/>
           </a:p>
         </p:txBody>
@@ -8327,7 +8367,7 @@
     </p:spTree>
     <p:extLst>
       <p:ext uri="{BB962C8B-B14F-4D97-AF65-F5344CB8AC3E}">
-        <p14:creationId xmlns:p14="http://schemas.microsoft.com/office/powerpoint/2010/main" val="2719668052"/>
+        <p14:creationId xmlns:p14="http://schemas.microsoft.com/office/powerpoint/2010/main" val="145540266"/>
       </p:ext>
     </p:extLst>
   </p:cSld>
@@ -8371,109 +8411,40 @@
             <p:ph type="title"/>
           </p:nvPr>
         </p:nvSpPr>
-        <p:spPr/>
-        <p:txBody>
-          <a:bodyPr/>
-          <a:lstStyle/>
-          <a:p>
-            <a:r>
-              <a:rPr lang="en-US" dirty="0" smtClean="0"/>
-              <a:t>Keep updated!</a:t>
-            </a:r>
-            <a:endParaRPr lang="en-US" dirty="0"/>
-          </a:p>
-        </p:txBody>
-      </p:sp>
-      <p:sp>
-        <p:nvSpPr>
-          <p:cNvPr id="3" name="Content Placeholder 2"/>
-          <p:cNvSpPr>
-            <a:spLocks noGrp="1"/>
-          </p:cNvSpPr>
-          <p:nvPr>
-            <p:ph idx="1"/>
-          </p:nvPr>
-        </p:nvSpPr>
         <p:spPr>
           <a:xfrm>
-            <a:off x="1003300" y="1587500"/>
-            <a:ext cx="7683500" cy="4525963"/>
+            <a:off x="617956" y="2219713"/>
+            <a:ext cx="8229600" cy="1143000"/>
           </a:xfrm>
         </p:spPr>
         <p:txBody>
-          <a:bodyPr/>
+          <a:bodyPr>
+            <a:normAutofit fontScale="90000"/>
+          </a:bodyPr>
           <a:lstStyle/>
           <a:p>
-            <a:pPr marL="0" indent="0">
-              <a:buNone/>
-            </a:pPr>
-            <a:r>
-              <a:rPr lang="en-US" dirty="0" err="1" smtClean="0"/>
-              <a:t>SciLifeLab</a:t>
-            </a:r>
             <a:r>
               <a:rPr lang="en-US" dirty="0" smtClean="0"/>
-              <a:t> WGS toolbox group:</a:t>
-            </a:r>
-          </a:p>
-          <a:p>
-            <a:pPr marL="0" indent="0">
-              <a:buNone/>
-            </a:pPr>
-            <a:r>
-              <a:rPr lang="en-US" dirty="0" smtClean="0">
-                <a:hlinkClick r:id="rId2"/>
-              </a:rPr>
-              <a:t>https</a:t>
-            </a:r>
-            <a:r>
-              <a:rPr lang="en-US" dirty="0">
-                <a:hlinkClick r:id="rId2"/>
-              </a:rPr>
-              <a:t>://</a:t>
-            </a:r>
-            <a:r>
-              <a:rPr lang="en-US" dirty="0" err="1">
-                <a:hlinkClick r:id="rId2"/>
-              </a:rPr>
-              <a:t>wabi-wiki.scilifelab.se</a:t>
-            </a:r>
-            <a:r>
-              <a:rPr lang="en-US" dirty="0">
-                <a:hlinkClick r:id="rId2"/>
-              </a:rPr>
-              <a:t>/display/SHGATG/</a:t>
-            </a:r>
-            <a:r>
-              <a:rPr lang="en-US" dirty="0" err="1">
-                <a:hlinkClick r:id="rId2"/>
-              </a:rPr>
-              <a:t>SciLifeLab+human+genome+analysis+toolbox+group</a:t>
-            </a:r>
-            <a:endParaRPr lang="en-US" dirty="0"/>
-          </a:p>
-          <a:p>
-            <a:pPr marL="0" indent="0">
-              <a:buNone/>
-            </a:pPr>
-            <a:endParaRPr lang="en-US" dirty="0" smtClean="0"/>
-          </a:p>
-          <a:p>
-            <a:pPr marL="0" indent="0">
-              <a:buNone/>
-            </a:pPr>
-            <a:r>
-              <a:rPr lang="en-US" dirty="0" smtClean="0"/>
-              <a:t>Recommended tools and workflow for somatic variant calling (and other things)</a:t>
-            </a:r>
-            <a:endParaRPr lang="en-US" dirty="0"/>
+              <a:t>Somatic variant </a:t>
+            </a:r>
+            <a:r>
+              <a:rPr lang="en-US" dirty="0"/>
+              <a:t>calling </a:t>
+            </a:r>
+            <a:br>
+              <a:rPr lang="en-US" dirty="0"/>
+            </a:br>
+            <a:r>
+              <a:rPr lang="en-US" dirty="0"/>
+              <a:t>Workflow</a:t>
+            </a:r>
           </a:p>
         </p:txBody>
       </p:sp>
     </p:spTree>
     <p:extLst>
       <p:ext uri="{BB962C8B-B14F-4D97-AF65-F5344CB8AC3E}">
-        <p14:creationId xmlns:p14="http://schemas.microsoft.com/office/powerpoint/2010/main" val="145540266"/>
+        <p14:creationId xmlns:p14="http://schemas.microsoft.com/office/powerpoint/2010/main" val="2577380534"/>
       </p:ext>
     </p:extLst>
   </p:cSld>
@@ -8519,7 +8490,7 @@
         </p:nvSpPr>
         <p:spPr>
           <a:xfrm>
-            <a:off x="617956" y="2219713"/>
+            <a:off x="457200" y="2026813"/>
             <a:ext cx="8229600" cy="1143000"/>
           </a:xfrm>
         </p:spPr>
@@ -8531,26 +8502,31 @@
           <a:p>
             <a:r>
               <a:rPr lang="en-US" dirty="0" smtClean="0"/>
-              <a:t>Somatic variant </a:t>
-            </a:r>
-            <a:r>
-              <a:rPr lang="en-US" dirty="0"/>
-              <a:t>calling </a:t>
+              <a:t>First…</a:t>
             </a:r>
             <a:br>
-              <a:rPr lang="en-US" dirty="0"/>
+              <a:rPr lang="en-US" dirty="0" smtClean="0"/>
             </a:br>
             <a:r>
-              <a:rPr lang="en-US" dirty="0"/>
-              <a:t>Workflow</a:t>
-            </a:r>
+              <a:rPr lang="en-US" dirty="0" smtClean="0"/>
+              <a:t>recap of </a:t>
+            </a:r>
+            <a:r>
+              <a:rPr lang="en-US" dirty="0" err="1" smtClean="0"/>
+              <a:t>germline</a:t>
+            </a:r>
+            <a:r>
+              <a:rPr lang="en-US" dirty="0" smtClean="0"/>
+              <a:t> variant calling workflow</a:t>
+            </a:r>
+            <a:endParaRPr lang="en-US" dirty="0"/>
           </a:p>
         </p:txBody>
       </p:sp>
     </p:spTree>
     <p:extLst>
       <p:ext uri="{BB962C8B-B14F-4D97-AF65-F5344CB8AC3E}">
-        <p14:creationId xmlns:p14="http://schemas.microsoft.com/office/powerpoint/2010/main" val="2577380534"/>
+        <p14:creationId xmlns:p14="http://schemas.microsoft.com/office/powerpoint/2010/main" val="3439845388"/>
       </p:ext>
     </p:extLst>
   </p:cSld>
@@ -8596,49 +8572,338 @@
         </p:nvSpPr>
         <p:spPr>
           <a:xfrm>
-            <a:off x="457200" y="2026813"/>
-            <a:ext cx="8229600" cy="1143000"/>
+            <a:off x="467544" y="404664"/>
+            <a:ext cx="8229600" cy="657550"/>
           </a:xfrm>
         </p:spPr>
         <p:txBody>
-          <a:bodyPr>
-            <a:normAutofit fontScale="90000"/>
+          <a:bodyPr lIns="82945" tIns="41473" rIns="82945" bIns="41473"/>
+          <a:lstStyle/>
+          <a:p>
+            <a:r>
+              <a:rPr lang="en-GB" sz="3600" noProof="0" dirty="0" err="1" smtClean="0"/>
+              <a:t>FastQ</a:t>
+            </a:r>
+            <a:r>
+              <a:rPr lang="en-GB" sz="3600" noProof="0" dirty="0" smtClean="0"/>
+              <a:t> format</a:t>
+            </a:r>
+            <a:endParaRPr lang="en-GB" sz="3600" noProof="0" dirty="0"/>
+          </a:p>
+        </p:txBody>
+      </p:sp>
+      <p:sp>
+        <p:nvSpPr>
+          <p:cNvPr id="3" name="Content Placeholder 2"/>
+          <p:cNvSpPr>
+            <a:spLocks noGrp="1"/>
+          </p:cNvSpPr>
+          <p:nvPr>
+            <p:ph idx="1"/>
+          </p:nvPr>
+        </p:nvSpPr>
+        <p:spPr>
+          <a:xfrm>
+            <a:off x="755576" y="1484784"/>
+            <a:ext cx="7678080" cy="4234342"/>
+          </a:xfrm>
+        </p:spPr>
+        <p:txBody>
+          <a:bodyPr lIns="82945" tIns="41473" rIns="82945" bIns="41473">
+            <a:normAutofit fontScale="85000" lnSpcReduction="10000"/>
           </a:bodyPr>
           <a:lstStyle/>
           <a:p>
-            <a:r>
-              <a:rPr lang="en-US" dirty="0" smtClean="0"/>
-              <a:t>First…</a:t>
-            </a:r>
-            <a:br>
-              <a:rPr lang="en-US" dirty="0" smtClean="0"/>
-            </a:br>
-            <a:r>
-              <a:rPr lang="en-US" dirty="0" smtClean="0"/>
-              <a:t>recap of </a:t>
-            </a:r>
-            <a:r>
-              <a:rPr lang="en-US" dirty="0" err="1" smtClean="0"/>
-              <a:t>germline</a:t>
-            </a:r>
-            <a:r>
-              <a:rPr lang="en-US" dirty="0" smtClean="0"/>
-              <a:t> variant calling workflow</a:t>
-            </a:r>
-            <a:endParaRPr lang="en-US" dirty="0"/>
+            <a:pPr marL="65298" indent="0">
+              <a:buNone/>
+            </a:pPr>
+            <a:r>
+              <a:rPr lang="en-GB" sz="1900" dirty="0"/>
+              <a:t>FASTQ format is a text-based format for storing both a nucleotide sequence and its corresponding quality scores. </a:t>
+            </a:r>
+            <a:endParaRPr lang="en-GB" sz="1900" dirty="0">
+              <a:solidFill>
+                <a:srgbClr val="FF0000"/>
+              </a:solidFill>
+            </a:endParaRPr>
+          </a:p>
+          <a:p>
+            <a:pPr marL="0" indent="0">
+              <a:spcBef>
+                <a:spcPts val="0"/>
+              </a:spcBef>
+              <a:buNone/>
+            </a:pPr>
+            <a:endParaRPr lang="en-GB" sz="1900" dirty="0">
+              <a:solidFill>
+                <a:srgbClr val="FF0000"/>
+              </a:solidFill>
+              <a:latin typeface="Courier New"/>
+              <a:cs typeface="Courier New"/>
+            </a:endParaRPr>
+          </a:p>
+          <a:p>
+            <a:pPr marL="0" indent="0">
+              <a:spcBef>
+                <a:spcPts val="0"/>
+              </a:spcBef>
+              <a:buNone/>
+            </a:pPr>
+            <a:r>
+              <a:rPr lang="en-GB" sz="1900" dirty="0">
+                <a:solidFill>
+                  <a:srgbClr val="FF0000"/>
+                </a:solidFill>
+                <a:latin typeface="Courier New"/>
+                <a:cs typeface="Courier New"/>
+              </a:rPr>
+              <a:t>@HWUSI-EAS100R:6:73:941:1973#0/1</a:t>
+            </a:r>
+          </a:p>
+          <a:p>
+            <a:pPr marL="0" indent="0">
+              <a:spcBef>
+                <a:spcPts val="0"/>
+              </a:spcBef>
+              <a:buNone/>
+            </a:pPr>
+            <a:r>
+              <a:rPr lang="en-GB" sz="1900" dirty="0">
+                <a:solidFill>
+                  <a:srgbClr val="FF0000"/>
+                </a:solidFill>
+                <a:latin typeface="Courier New"/>
+                <a:cs typeface="Courier New"/>
+              </a:rPr>
+              <a:t>GATTTGGGGTTCAAAGCAGTATCGATCAAATAGTAAATCCATTTGTTCAACTCACAGTTT</a:t>
+            </a:r>
+          </a:p>
+          <a:p>
+            <a:pPr marL="0" indent="0">
+              <a:spcBef>
+                <a:spcPts val="0"/>
+              </a:spcBef>
+              <a:buNone/>
+            </a:pPr>
+            <a:r>
+              <a:rPr lang="en-GB" sz="1900" dirty="0">
+                <a:solidFill>
+                  <a:srgbClr val="FF0000"/>
+                </a:solidFill>
+                <a:latin typeface="Courier New"/>
+                <a:cs typeface="Courier New"/>
+              </a:rPr>
+              <a:t>+</a:t>
+            </a:r>
+          </a:p>
+          <a:p>
+            <a:pPr marL="0" indent="0">
+              <a:spcBef>
+                <a:spcPts val="0"/>
+              </a:spcBef>
+              <a:buNone/>
+            </a:pPr>
+            <a:r>
+              <a:rPr lang="en-GB" sz="1900" dirty="0">
+                <a:solidFill>
+                  <a:srgbClr val="FF0000"/>
+                </a:solidFill>
+                <a:latin typeface="Courier New"/>
+                <a:cs typeface="Courier New"/>
+              </a:rPr>
+              <a:t>!''*((((***+))%%%++)(%%%%).1***-+*''))**55CCF&gt;&gt;&gt;&gt;&gt;&gt;CCCCCCC65</a:t>
+            </a:r>
+          </a:p>
+          <a:p>
+            <a:pPr marL="0" indent="0">
+              <a:spcBef>
+                <a:spcPts val="0"/>
+              </a:spcBef>
+              <a:spcAft>
+                <a:spcPts val="544"/>
+              </a:spcAft>
+              <a:buNone/>
+            </a:pPr>
+            <a:endParaRPr lang="en-GB" sz="1900" dirty="0">
+              <a:latin typeface="Courier New"/>
+              <a:cs typeface="Courier New"/>
+            </a:endParaRPr>
+          </a:p>
+          <a:p>
+            <a:pPr marL="65298" indent="0">
+              <a:spcBef>
+                <a:spcPts val="454"/>
+              </a:spcBef>
+              <a:spcAft>
+                <a:spcPts val="544"/>
+              </a:spcAft>
+              <a:buNone/>
+            </a:pPr>
+            <a:r>
+              <a:rPr lang="en-GB" sz="1900" dirty="0"/>
+              <a:t>1</a:t>
+            </a:r>
+            <a:r>
+              <a:rPr lang="en-GB" sz="1900" baseline="30000" dirty="0"/>
+              <a:t>st</a:t>
+            </a:r>
+            <a:r>
+              <a:rPr lang="en-GB" sz="1900" dirty="0"/>
+              <a:t> row: sequence identifier (machine ID, x-y coordinates, additional info)</a:t>
+            </a:r>
+          </a:p>
+          <a:p>
+            <a:pPr marL="65298" indent="0">
+              <a:spcBef>
+                <a:spcPts val="454"/>
+              </a:spcBef>
+              <a:spcAft>
+                <a:spcPts val="544"/>
+              </a:spcAft>
+              <a:buNone/>
+            </a:pPr>
+            <a:r>
+              <a:rPr lang="en-GB" sz="1900" dirty="0"/>
+              <a:t>2</a:t>
+            </a:r>
+            <a:r>
+              <a:rPr lang="en-GB" sz="1900" baseline="30000" dirty="0"/>
+              <a:t>nd</a:t>
+            </a:r>
+            <a:r>
+              <a:rPr lang="en-GB" sz="1900" dirty="0"/>
+              <a:t> row: The actual sequence</a:t>
+            </a:r>
+          </a:p>
+          <a:p>
+            <a:pPr marL="65298" indent="0">
+              <a:spcBef>
+                <a:spcPts val="454"/>
+              </a:spcBef>
+              <a:spcAft>
+                <a:spcPts val="544"/>
+              </a:spcAft>
+              <a:buNone/>
+            </a:pPr>
+            <a:r>
+              <a:rPr lang="en-GB" sz="1900" dirty="0"/>
+              <a:t>3</a:t>
+            </a:r>
+            <a:r>
+              <a:rPr lang="en-GB" sz="1900" baseline="30000" dirty="0"/>
+              <a:t>rd</a:t>
+            </a:r>
+            <a:r>
+              <a:rPr lang="en-GB" sz="1900" dirty="0"/>
+              <a:t> row: starts with “+” and optionally the same identifier as in the 1</a:t>
+            </a:r>
+            <a:r>
+              <a:rPr lang="en-GB" sz="1900" baseline="30000" dirty="0"/>
+              <a:t>st</a:t>
+            </a:r>
+            <a:r>
+              <a:rPr lang="en-GB" sz="1900" dirty="0"/>
+              <a:t> row</a:t>
+            </a:r>
+          </a:p>
+          <a:p>
+            <a:pPr marL="65298" indent="0">
+              <a:spcBef>
+                <a:spcPts val="454"/>
+              </a:spcBef>
+              <a:spcAft>
+                <a:spcPts val="544"/>
+              </a:spcAft>
+              <a:buNone/>
+            </a:pPr>
+            <a:r>
+              <a:rPr lang="en-GB" sz="1900" dirty="0"/>
+              <a:t>4</a:t>
+            </a:r>
+            <a:r>
+              <a:rPr lang="en-GB" sz="1900" baseline="30000" dirty="0"/>
+              <a:t>th</a:t>
+            </a:r>
+            <a:r>
+              <a:rPr lang="en-GB" sz="1900" dirty="0"/>
+              <a:t> row: Quality score for each base in read	</a:t>
+            </a:r>
+          </a:p>
+          <a:p>
+            <a:pPr marL="65298" indent="0">
+              <a:spcBef>
+                <a:spcPts val="454"/>
+              </a:spcBef>
+              <a:spcAft>
+                <a:spcPts val="544"/>
+              </a:spcAft>
+              <a:buNone/>
+            </a:pPr>
+            <a:r>
+              <a:rPr lang="en-GB" sz="1900" dirty="0"/>
+              <a:t>Quality score: ASCII representation of score for each base (i.e. the probability that the corresponding base call is incorrect.) Platform specific scaling!</a:t>
+            </a:r>
+          </a:p>
+          <a:p>
+            <a:pPr marL="65298" indent="0">
+              <a:spcBef>
+                <a:spcPts val="454"/>
+              </a:spcBef>
+              <a:spcAft>
+                <a:spcPts val="544"/>
+              </a:spcAft>
+              <a:buNone/>
+            </a:pPr>
+            <a:r>
+              <a:rPr lang="en-GB" sz="1900" dirty="0"/>
+              <a:t>For more info: http://</a:t>
+            </a:r>
+            <a:r>
+              <a:rPr lang="en-GB" sz="1900" dirty="0" err="1"/>
+              <a:t>en.wikipedia.org</a:t>
+            </a:r>
+            <a:r>
+              <a:rPr lang="en-GB" sz="1900" dirty="0"/>
+              <a:t>/wiki/</a:t>
+            </a:r>
+            <a:r>
+              <a:rPr lang="en-GB" sz="1900" dirty="0" err="1"/>
+              <a:t>FASTQ_format</a:t>
+            </a:r>
+            <a:endParaRPr lang="en-GB" sz="1900" dirty="0"/>
+          </a:p>
+          <a:p>
+            <a:pPr marL="65298" indent="0">
+              <a:buNone/>
+            </a:pPr>
+            <a:endParaRPr lang="en-GB" sz="1900" dirty="0"/>
+          </a:p>
+          <a:p>
+            <a:pPr marL="65298" indent="0">
+              <a:buNone/>
+            </a:pPr>
+            <a:endParaRPr lang="en-GB" sz="1600" dirty="0"/>
           </a:p>
         </p:txBody>
       </p:sp>
     </p:spTree>
     <p:extLst>
       <p:ext uri="{BB962C8B-B14F-4D97-AF65-F5344CB8AC3E}">
-        <p14:creationId xmlns:p14="http://schemas.microsoft.com/office/powerpoint/2010/main" val="3439845388"/>
+        <p14:creationId xmlns:p14="http://schemas.microsoft.com/office/powerpoint/2010/main" val="1324641791"/>
       </p:ext>
     </p:extLst>
   </p:cSld>
   <p:clrMapOvr>
     <a:masterClrMapping/>
   </p:clrMapOvr>
+  <mc:AlternateContent xmlns:mc="http://schemas.openxmlformats.org/markup-compatibility/2006" xmlns:p14="http://schemas.microsoft.com/office/powerpoint/2010/main">
+    <mc:Choice Requires="p14">
+      <p:transition spd="slow" p14:dur="2000"/>
+    </mc:Choice>
+    <mc:Fallback xmlns="">
+      <p:transition xmlns:p14="http://schemas.microsoft.com/office/powerpoint/2010/main" spd="slow"/>
+    </mc:Fallback>
+  </mc:AlternateContent>
   <p:timing>
     <p:tnLst>
       <p:par>
@@ -8676,377 +8941,6 @@
             <p:ph type="title"/>
           </p:nvPr>
         </p:nvSpPr>
-        <p:spPr>
-          <a:xfrm>
-            <a:off x="467544" y="404664"/>
-            <a:ext cx="8229600" cy="657550"/>
-          </a:xfrm>
-        </p:spPr>
-        <p:txBody>
-          <a:bodyPr lIns="82945" tIns="41473" rIns="82945" bIns="41473"/>
-          <a:lstStyle/>
-          <a:p>
-            <a:r>
-              <a:rPr lang="en-GB" sz="3600" noProof="0" dirty="0" err="1" smtClean="0"/>
-              <a:t>FastQ</a:t>
-            </a:r>
-            <a:r>
-              <a:rPr lang="en-GB" sz="3600" noProof="0" dirty="0" smtClean="0"/>
-              <a:t> format</a:t>
-            </a:r>
-            <a:endParaRPr lang="en-GB" sz="3600" noProof="0" dirty="0"/>
-          </a:p>
-        </p:txBody>
-      </p:sp>
-      <p:sp>
-        <p:nvSpPr>
-          <p:cNvPr id="3" name="Content Placeholder 2"/>
-          <p:cNvSpPr>
-            <a:spLocks noGrp="1"/>
-          </p:cNvSpPr>
-          <p:nvPr>
-            <p:ph idx="1"/>
-          </p:nvPr>
-        </p:nvSpPr>
-        <p:spPr>
-          <a:xfrm>
-            <a:off x="755576" y="1484784"/>
-            <a:ext cx="7678080" cy="4234342"/>
-          </a:xfrm>
-        </p:spPr>
-        <p:txBody>
-          <a:bodyPr lIns="82945" tIns="41473" rIns="82945" bIns="41473">
-            <a:normAutofit fontScale="85000" lnSpcReduction="10000"/>
-          </a:bodyPr>
-          <a:lstStyle/>
-          <a:p>
-            <a:pPr marL="65298" indent="0">
-              <a:buNone/>
-            </a:pPr>
-            <a:r>
-              <a:rPr lang="en-GB" sz="1900" dirty="0"/>
-              <a:t>FASTQ format is a text-based format for storing both a nucleotide sequence and its corresponding quality scores. </a:t>
-            </a:r>
-            <a:endParaRPr lang="en-GB" sz="1900" dirty="0">
-              <a:solidFill>
-                <a:srgbClr val="FF0000"/>
-              </a:solidFill>
-            </a:endParaRPr>
-          </a:p>
-          <a:p>
-            <a:pPr marL="0" indent="0">
-              <a:spcBef>
-                <a:spcPts val="0"/>
-              </a:spcBef>
-              <a:buNone/>
-            </a:pPr>
-            <a:endParaRPr lang="en-GB" sz="1900" dirty="0">
-              <a:solidFill>
-                <a:srgbClr val="FF0000"/>
-              </a:solidFill>
-              <a:latin typeface="Courier New"/>
-              <a:cs typeface="Courier New"/>
-            </a:endParaRPr>
-          </a:p>
-          <a:p>
-            <a:pPr marL="0" indent="0">
-              <a:spcBef>
-                <a:spcPts val="0"/>
-              </a:spcBef>
-              <a:buNone/>
-            </a:pPr>
-            <a:r>
-              <a:rPr lang="en-GB" sz="1900" dirty="0">
-                <a:solidFill>
-                  <a:srgbClr val="FF0000"/>
-                </a:solidFill>
-                <a:latin typeface="Courier New"/>
-                <a:cs typeface="Courier New"/>
-              </a:rPr>
-              <a:t>@HWUSI-EAS100R:6:73:941:1973#0/1</a:t>
-            </a:r>
-          </a:p>
-          <a:p>
-            <a:pPr marL="0" indent="0">
-              <a:spcBef>
-                <a:spcPts val="0"/>
-              </a:spcBef>
-              <a:buNone/>
-            </a:pPr>
-            <a:r>
-              <a:rPr lang="en-GB" sz="1900" dirty="0">
-                <a:solidFill>
-                  <a:srgbClr val="FF0000"/>
-                </a:solidFill>
-                <a:latin typeface="Courier New"/>
-                <a:cs typeface="Courier New"/>
-              </a:rPr>
-              <a:t>GATTTGGGGTTCAAAGCAGTATCGATCAAATAGTAAATCCATTTGTTCAACTCACAGTTT</a:t>
-            </a:r>
-          </a:p>
-          <a:p>
-            <a:pPr marL="0" indent="0">
-              <a:spcBef>
-                <a:spcPts val="0"/>
-              </a:spcBef>
-              <a:buNone/>
-            </a:pPr>
-            <a:r>
-              <a:rPr lang="en-GB" sz="1900" dirty="0">
-                <a:solidFill>
-                  <a:srgbClr val="FF0000"/>
-                </a:solidFill>
-                <a:latin typeface="Courier New"/>
-                <a:cs typeface="Courier New"/>
-              </a:rPr>
-              <a:t>+</a:t>
-            </a:r>
-          </a:p>
-          <a:p>
-            <a:pPr marL="0" indent="0">
-              <a:spcBef>
-                <a:spcPts val="0"/>
-              </a:spcBef>
-              <a:buNone/>
-            </a:pPr>
-            <a:r>
-              <a:rPr lang="en-GB" sz="1900" dirty="0">
-                <a:solidFill>
-                  <a:srgbClr val="FF0000"/>
-                </a:solidFill>
-                <a:latin typeface="Courier New"/>
-                <a:cs typeface="Courier New"/>
-              </a:rPr>
-              <a:t>!''*((((***+))%%%++)(%%%%).1***-+*''))**55CCF&gt;&gt;&gt;&gt;&gt;&gt;CCCCCCC65</a:t>
-            </a:r>
-          </a:p>
-          <a:p>
-            <a:pPr marL="0" indent="0">
-              <a:spcBef>
-                <a:spcPts val="0"/>
-              </a:spcBef>
-              <a:spcAft>
-                <a:spcPts val="544"/>
-              </a:spcAft>
-              <a:buNone/>
-            </a:pPr>
-            <a:endParaRPr lang="en-GB" sz="1900" dirty="0">
-              <a:latin typeface="Courier New"/>
-              <a:cs typeface="Courier New"/>
-            </a:endParaRPr>
-          </a:p>
-          <a:p>
-            <a:pPr marL="65298" indent="0">
-              <a:spcBef>
-                <a:spcPts val="454"/>
-              </a:spcBef>
-              <a:spcAft>
-                <a:spcPts val="544"/>
-              </a:spcAft>
-              <a:buNone/>
-            </a:pPr>
-            <a:r>
-              <a:rPr lang="en-GB" sz="1900" dirty="0"/>
-              <a:t>1</a:t>
-            </a:r>
-            <a:r>
-              <a:rPr lang="en-GB" sz="1900" baseline="30000" dirty="0"/>
-              <a:t>st</a:t>
-            </a:r>
-            <a:r>
-              <a:rPr lang="en-GB" sz="1900" dirty="0"/>
-              <a:t> row: sequence identifier (machine ID, x-y coordinates, additional info)</a:t>
-            </a:r>
-          </a:p>
-          <a:p>
-            <a:pPr marL="65298" indent="0">
-              <a:spcBef>
-                <a:spcPts val="454"/>
-              </a:spcBef>
-              <a:spcAft>
-                <a:spcPts val="544"/>
-              </a:spcAft>
-              <a:buNone/>
-            </a:pPr>
-            <a:r>
-              <a:rPr lang="en-GB" sz="1900" dirty="0"/>
-              <a:t>2</a:t>
-            </a:r>
-            <a:r>
-              <a:rPr lang="en-GB" sz="1900" baseline="30000" dirty="0"/>
-              <a:t>nd</a:t>
-            </a:r>
-            <a:r>
-              <a:rPr lang="en-GB" sz="1900" dirty="0"/>
-              <a:t> row: The actual sequence</a:t>
-            </a:r>
-          </a:p>
-          <a:p>
-            <a:pPr marL="65298" indent="0">
-              <a:spcBef>
-                <a:spcPts val="454"/>
-              </a:spcBef>
-              <a:spcAft>
-                <a:spcPts val="544"/>
-              </a:spcAft>
-              <a:buNone/>
-            </a:pPr>
-            <a:r>
-              <a:rPr lang="en-GB" sz="1900" dirty="0"/>
-              <a:t>3</a:t>
-            </a:r>
-            <a:r>
-              <a:rPr lang="en-GB" sz="1900" baseline="30000" dirty="0"/>
-              <a:t>rd</a:t>
-            </a:r>
-            <a:r>
-              <a:rPr lang="en-GB" sz="1900" dirty="0"/>
-              <a:t> row: starts with “+” and optionally the same identifier as in the 1</a:t>
-            </a:r>
-            <a:r>
-              <a:rPr lang="en-GB" sz="1900" baseline="30000" dirty="0"/>
-              <a:t>st</a:t>
-            </a:r>
-            <a:r>
-              <a:rPr lang="en-GB" sz="1900" dirty="0"/>
-              <a:t> row</a:t>
-            </a:r>
-          </a:p>
-          <a:p>
-            <a:pPr marL="65298" indent="0">
-              <a:spcBef>
-                <a:spcPts val="454"/>
-              </a:spcBef>
-              <a:spcAft>
-                <a:spcPts val="544"/>
-              </a:spcAft>
-              <a:buNone/>
-            </a:pPr>
-            <a:r>
-              <a:rPr lang="en-GB" sz="1900" dirty="0"/>
-              <a:t>4</a:t>
-            </a:r>
-            <a:r>
-              <a:rPr lang="en-GB" sz="1900" baseline="30000" dirty="0"/>
-              <a:t>th</a:t>
-            </a:r>
-            <a:r>
-              <a:rPr lang="en-GB" sz="1900" dirty="0"/>
-              <a:t> row: Quality score for each base in read	</a:t>
-            </a:r>
-          </a:p>
-          <a:p>
-            <a:pPr marL="65298" indent="0">
-              <a:spcBef>
-                <a:spcPts val="454"/>
-              </a:spcBef>
-              <a:spcAft>
-                <a:spcPts val="544"/>
-              </a:spcAft>
-              <a:buNone/>
-            </a:pPr>
-            <a:r>
-              <a:rPr lang="en-GB" sz="1900" dirty="0"/>
-              <a:t>Quality score: ASCII representation of score for each base (i.e. the probability that the corresponding base call is incorrect.) Platform specific scaling!</a:t>
-            </a:r>
-          </a:p>
-          <a:p>
-            <a:pPr marL="65298" indent="0">
-              <a:spcBef>
-                <a:spcPts val="454"/>
-              </a:spcBef>
-              <a:spcAft>
-                <a:spcPts val="544"/>
-              </a:spcAft>
-              <a:buNone/>
-            </a:pPr>
-            <a:r>
-              <a:rPr lang="en-GB" sz="1900" dirty="0"/>
-              <a:t>For more info: http://</a:t>
-            </a:r>
-            <a:r>
-              <a:rPr lang="en-GB" sz="1900" dirty="0" err="1"/>
-              <a:t>en.wikipedia.org</a:t>
-            </a:r>
-            <a:r>
-              <a:rPr lang="en-GB" sz="1900" dirty="0"/>
-              <a:t>/wiki/</a:t>
-            </a:r>
-            <a:r>
-              <a:rPr lang="en-GB" sz="1900" dirty="0" err="1"/>
-              <a:t>FASTQ_format</a:t>
-            </a:r>
-            <a:endParaRPr lang="en-GB" sz="1900" dirty="0"/>
-          </a:p>
-          <a:p>
-            <a:pPr marL="65298" indent="0">
-              <a:buNone/>
-            </a:pPr>
-            <a:endParaRPr lang="en-GB" sz="1900" dirty="0"/>
-          </a:p>
-          <a:p>
-            <a:pPr marL="65298" indent="0">
-              <a:buNone/>
-            </a:pPr>
-            <a:endParaRPr lang="en-GB" sz="1600" dirty="0"/>
-          </a:p>
-        </p:txBody>
-      </p:sp>
-    </p:spTree>
-    <p:extLst>
-      <p:ext uri="{BB962C8B-B14F-4D97-AF65-F5344CB8AC3E}">
-        <p14:creationId xmlns:p14="http://schemas.microsoft.com/office/powerpoint/2010/main" val="1324641791"/>
-      </p:ext>
-    </p:extLst>
-  </p:cSld>
-  <p:clrMapOvr>
-    <a:masterClrMapping/>
-  </p:clrMapOvr>
-  <mc:AlternateContent xmlns:mc="http://schemas.openxmlformats.org/markup-compatibility/2006" xmlns:p14="http://schemas.microsoft.com/office/powerpoint/2010/main">
-    <mc:Choice Requires="p14">
-      <p:transition spd="slow" p14:dur="2000"/>
-    </mc:Choice>
-    <mc:Fallback xmlns="">
-      <p:transition xmlns:p14="http://schemas.microsoft.com/office/powerpoint/2010/main" spd="slow"/>
-    </mc:Fallback>
-  </mc:AlternateContent>
-  <p:timing>
-    <p:tnLst>
-      <p:par>
-        <p:cTn xmlns:p14="http://schemas.microsoft.com/office/powerpoint/2010/main" id="1" dur="indefinite" restart="never" nodeType="tmRoot"/>
-      </p:par>
-    </p:tnLst>
-  </p:timing>
-</p:sld>
-</file>
-
-<file path=ppt/slides/slide28.xml><?xml version="1.0" encoding="utf-8"?>
-<p:sld xmlns:a="http://schemas.openxmlformats.org/drawingml/2006/main" xmlns:r="http://schemas.openxmlformats.org/officeDocument/2006/relationships" xmlns:p="http://schemas.openxmlformats.org/presentationml/2006/main">
-  <p:cSld>
-    <p:spTree>
-      <p:nvGrpSpPr>
-        <p:cNvPr id="1" name=""/>
-        <p:cNvGrpSpPr/>
-        <p:nvPr/>
-      </p:nvGrpSpPr>
-      <p:grpSpPr>
-        <a:xfrm>
-          <a:off x="0" y="0"/>
-          <a:ext cx="0" cy="0"/>
-          <a:chOff x="0" y="0"/>
-          <a:chExt cx="0" cy="0"/>
-        </a:xfrm>
-      </p:grpSpPr>
-      <p:sp>
-        <p:nvSpPr>
-          <p:cNvPr id="2" name="Title 1"/>
-          <p:cNvSpPr>
-            <a:spLocks noGrp="1"/>
-          </p:cNvSpPr>
-          <p:nvPr>
-            <p:ph type="title"/>
-          </p:nvPr>
-        </p:nvSpPr>
         <p:spPr/>
         <p:txBody>
           <a:bodyPr/>
@@ -9596,7 +9490,7 @@
             <a:fld id="{EF15D6EA-EBF7-4C2E-A1CC-C279B7E6D53A}" type="slidenum">
               <a:rPr lang="en-GB" smtClean="0"/>
               <a:pPr/>
-              <a:t>28</a:t>
+              <a:t>27</a:t>
             </a:fld>
             <a:endParaRPr lang="en-GB" dirty="0"/>
           </a:p>
@@ -9674,7 +9568,7 @@
 </p:sld>
 </file>
 
-<file path=ppt/slides/slide29.xml><?xml version="1.0" encoding="utf-8"?>
+<file path=ppt/slides/slide28.xml><?xml version="1.0" encoding="utf-8"?>
 <p:sld xmlns:a="http://schemas.openxmlformats.org/drawingml/2006/main" xmlns:r="http://schemas.openxmlformats.org/officeDocument/2006/relationships" xmlns:p="http://schemas.openxmlformats.org/presentationml/2006/main">
   <p:cSld>
     <p:spTree>
@@ -9763,6 +9657,90 @@
 </p:sld>
 </file>
 
+<file path=ppt/slides/slide29.xml><?xml version="1.0" encoding="utf-8"?>
+<p:sld xmlns:a="http://schemas.openxmlformats.org/drawingml/2006/main" xmlns:r="http://schemas.openxmlformats.org/officeDocument/2006/relationships" xmlns:p="http://schemas.openxmlformats.org/presentationml/2006/main">
+  <p:cSld>
+    <p:spTree>
+      <p:nvGrpSpPr>
+        <p:cNvPr id="1" name=""/>
+        <p:cNvGrpSpPr/>
+        <p:nvPr/>
+      </p:nvGrpSpPr>
+      <p:grpSpPr>
+        <a:xfrm>
+          <a:off x="0" y="0"/>
+          <a:ext cx="0" cy="0"/>
+          <a:chOff x="0" y="0"/>
+          <a:chExt cx="0" cy="0"/>
+        </a:xfrm>
+      </p:grpSpPr>
+      <p:sp>
+        <p:nvSpPr>
+          <p:cNvPr id="2" name="Title 1"/>
+          <p:cNvSpPr>
+            <a:spLocks noGrp="1"/>
+          </p:cNvSpPr>
+          <p:nvPr>
+            <p:ph type="title"/>
+          </p:nvPr>
+        </p:nvSpPr>
+        <p:spPr/>
+        <p:txBody>
+          <a:bodyPr/>
+          <a:lstStyle/>
+          <a:p>
+            <a:r>
+              <a:rPr lang="en-US" sz="3600" dirty="0" smtClean="0"/>
+              <a:t>Genome Analysis Tool Kit (GATK)</a:t>
+            </a:r>
+            <a:endParaRPr lang="en-US" sz="3600" dirty="0"/>
+          </a:p>
+        </p:txBody>
+      </p:sp>
+      <p:pic>
+        <p:nvPicPr>
+          <p:cNvPr id="4" name="Picture 3"/>
+          <p:cNvPicPr>
+            <a:picLocks noChangeAspect="1"/>
+          </p:cNvPicPr>
+          <p:nvPr/>
+        </p:nvPicPr>
+        <p:blipFill>
+          <a:blip r:embed="rId2"/>
+          <a:stretch>
+            <a:fillRect/>
+          </a:stretch>
+        </p:blipFill>
+        <p:spPr>
+          <a:xfrm>
+            <a:off x="0" y="1279164"/>
+            <a:ext cx="9144000" cy="4741333"/>
+          </a:xfrm>
+          <a:prstGeom prst="rect">
+            <a:avLst/>
+          </a:prstGeom>
+        </p:spPr>
+      </p:pic>
+    </p:spTree>
+    <p:extLst>
+      <p:ext uri="{BB962C8B-B14F-4D97-AF65-F5344CB8AC3E}">
+        <p14:creationId xmlns:p14="http://schemas.microsoft.com/office/powerpoint/2010/main" val="1170899048"/>
+      </p:ext>
+    </p:extLst>
+  </p:cSld>
+  <p:clrMapOvr>
+    <a:masterClrMapping/>
+  </p:clrMapOvr>
+  <p:timing>
+    <p:tnLst>
+      <p:par>
+        <p:cTn xmlns:p14="http://schemas.microsoft.com/office/powerpoint/2010/main" id="1" dur="indefinite" restart="never" nodeType="tmRoot"/>
+      </p:par>
+    </p:tnLst>
+  </p:timing>
+</p:sld>
+</file>
+
 <file path=ppt/slides/slide3.xml><?xml version="1.0" encoding="utf-8"?>
 <p:sld xmlns:a="http://schemas.openxmlformats.org/drawingml/2006/main" xmlns:r="http://schemas.openxmlformats.org/officeDocument/2006/relationships" xmlns:p="http://schemas.openxmlformats.org/presentationml/2006/main">
   <p:cSld>
@@ -9855,90 +9833,6 @@
             <p:ph type="title"/>
           </p:nvPr>
         </p:nvSpPr>
-        <p:spPr/>
-        <p:txBody>
-          <a:bodyPr/>
-          <a:lstStyle/>
-          <a:p>
-            <a:r>
-              <a:rPr lang="en-US" sz="3600" dirty="0" smtClean="0"/>
-              <a:t>Genome Analysis Tool Kit (GATK)</a:t>
-            </a:r>
-            <a:endParaRPr lang="en-US" sz="3600" dirty="0"/>
-          </a:p>
-        </p:txBody>
-      </p:sp>
-      <p:pic>
-        <p:nvPicPr>
-          <p:cNvPr id="4" name="Picture 3"/>
-          <p:cNvPicPr>
-            <a:picLocks noChangeAspect="1"/>
-          </p:cNvPicPr>
-          <p:nvPr/>
-        </p:nvPicPr>
-        <p:blipFill>
-          <a:blip r:embed="rId2"/>
-          <a:stretch>
-            <a:fillRect/>
-          </a:stretch>
-        </p:blipFill>
-        <p:spPr>
-          <a:xfrm>
-            <a:off x="0" y="1279164"/>
-            <a:ext cx="9144000" cy="4741333"/>
-          </a:xfrm>
-          <a:prstGeom prst="rect">
-            <a:avLst/>
-          </a:prstGeom>
-        </p:spPr>
-      </p:pic>
-    </p:spTree>
-    <p:extLst>
-      <p:ext uri="{BB962C8B-B14F-4D97-AF65-F5344CB8AC3E}">
-        <p14:creationId xmlns:p14="http://schemas.microsoft.com/office/powerpoint/2010/main" val="1170899048"/>
-      </p:ext>
-    </p:extLst>
-  </p:cSld>
-  <p:clrMapOvr>
-    <a:masterClrMapping/>
-  </p:clrMapOvr>
-  <p:timing>
-    <p:tnLst>
-      <p:par>
-        <p:cTn xmlns:p14="http://schemas.microsoft.com/office/powerpoint/2010/main" id="1" dur="indefinite" restart="never" nodeType="tmRoot"/>
-      </p:par>
-    </p:tnLst>
-  </p:timing>
-</p:sld>
-</file>
-
-<file path=ppt/slides/slide31.xml><?xml version="1.0" encoding="utf-8"?>
-<p:sld xmlns:a="http://schemas.openxmlformats.org/drawingml/2006/main" xmlns:r="http://schemas.openxmlformats.org/officeDocument/2006/relationships" xmlns:p="http://schemas.openxmlformats.org/presentationml/2006/main">
-  <p:cSld>
-    <p:spTree>
-      <p:nvGrpSpPr>
-        <p:cNvPr id="1" name=""/>
-        <p:cNvGrpSpPr/>
-        <p:nvPr/>
-      </p:nvGrpSpPr>
-      <p:grpSpPr>
-        <a:xfrm>
-          <a:off x="0" y="0"/>
-          <a:ext cx="0" cy="0"/>
-          <a:chOff x="0" y="0"/>
-          <a:chExt cx="0" cy="0"/>
-        </a:xfrm>
-      </p:grpSpPr>
-      <p:sp>
-        <p:nvSpPr>
-          <p:cNvPr id="2" name="Title 1"/>
-          <p:cNvSpPr>
-            <a:spLocks noGrp="1"/>
-          </p:cNvSpPr>
-          <p:nvPr>
-            <p:ph type="title"/>
-          </p:nvPr>
-        </p:nvSpPr>
         <p:spPr>
           <a:xfrm>
             <a:off x="457200" y="2292051"/>
@@ -9986,7 +9880,7 @@
 </p:sld>
 </file>
 
-<file path=ppt/slides/slide32.xml><?xml version="1.0" encoding="utf-8"?>
+<file path=ppt/slides/slide31.xml><?xml version="1.0" encoding="utf-8"?>
 <p:sld xmlns:a="http://schemas.openxmlformats.org/drawingml/2006/main" xmlns:r="http://schemas.openxmlformats.org/officeDocument/2006/relationships" xmlns:p="http://schemas.openxmlformats.org/presentationml/2006/main">
   <p:cSld>
     <p:spTree>
@@ -10053,7 +9947,7 @@
 </p:sld>
 </file>
 
-<file path=ppt/slides/slide33.xml><?xml version="1.0" encoding="utf-8"?>
+<file path=ppt/slides/slide32.xml><?xml version="1.0" encoding="utf-8"?>
 <p:sld xmlns:a="http://schemas.openxmlformats.org/drawingml/2006/main" xmlns:r="http://schemas.openxmlformats.org/officeDocument/2006/relationships" xmlns:p="http://schemas.openxmlformats.org/presentationml/2006/main">
   <p:cSld>
     <p:spTree>
@@ -10181,7 +10075,7 @@
 </p:sld>
 </file>
 
-<file path=ppt/slides/slide34.xml><?xml version="1.0" encoding="utf-8"?>
+<file path=ppt/slides/slide33.xml><?xml version="1.0" encoding="utf-8"?>
 <p:sld xmlns:a="http://schemas.openxmlformats.org/drawingml/2006/main" xmlns:r="http://schemas.openxmlformats.org/officeDocument/2006/relationships" xmlns:p="http://schemas.openxmlformats.org/presentationml/2006/main">
   <p:cSld>
     <p:spTree>
@@ -10304,7 +10198,7 @@
 </p:sld>
 </file>
 
-<file path=ppt/slides/slide35.xml><?xml version="1.0" encoding="utf-8"?>
+<file path=ppt/slides/slide34.xml><?xml version="1.0" encoding="utf-8"?>
 <p:sld xmlns:a="http://schemas.openxmlformats.org/drawingml/2006/main" xmlns:r="http://schemas.openxmlformats.org/officeDocument/2006/relationships" xmlns:p="http://schemas.openxmlformats.org/presentationml/2006/main">
   <p:cSld>
     <p:spTree>
@@ -10972,6 +10866,571 @@
     <p:extLst>
       <p:ext uri="{BB962C8B-B14F-4D97-AF65-F5344CB8AC3E}">
         <p14:creationId xmlns:p14="http://schemas.microsoft.com/office/powerpoint/2010/main" val="3872517797"/>
+      </p:ext>
+    </p:extLst>
+  </p:cSld>
+  <p:clrMapOvr>
+    <a:masterClrMapping/>
+  </p:clrMapOvr>
+  <p:timing>
+    <p:tnLst>
+      <p:par>
+        <p:cTn xmlns:p14="http://schemas.microsoft.com/office/powerpoint/2010/main" id="1" dur="indefinite" restart="never" nodeType="tmRoot"/>
+      </p:par>
+    </p:tnLst>
+  </p:timing>
+</p:sld>
+</file>
+
+<file path=ppt/slides/slide35.xml><?xml version="1.0" encoding="utf-8"?>
+<p:sld xmlns:a="http://schemas.openxmlformats.org/drawingml/2006/main" xmlns:r="http://schemas.openxmlformats.org/officeDocument/2006/relationships" xmlns:p="http://schemas.openxmlformats.org/presentationml/2006/main">
+  <p:cSld>
+    <p:spTree>
+      <p:nvGrpSpPr>
+        <p:cNvPr id="1" name=""/>
+        <p:cNvGrpSpPr/>
+        <p:nvPr/>
+      </p:nvGrpSpPr>
+      <p:grpSpPr>
+        <a:xfrm>
+          <a:off x="0" y="0"/>
+          <a:ext cx="0" cy="0"/>
+          <a:chOff x="0" y="0"/>
+          <a:chExt cx="0" cy="0"/>
+        </a:xfrm>
+      </p:grpSpPr>
+      <p:sp>
+        <p:nvSpPr>
+          <p:cNvPr id="2" name="Title 1"/>
+          <p:cNvSpPr>
+            <a:spLocks noGrp="1"/>
+          </p:cNvSpPr>
+          <p:nvPr>
+            <p:ph type="title"/>
+          </p:nvPr>
+        </p:nvSpPr>
+        <p:spPr/>
+        <p:txBody>
+          <a:bodyPr/>
+          <a:lstStyle/>
+          <a:p>
+            <a:r>
+              <a:rPr lang="en-US" dirty="0" err="1" smtClean="0"/>
+              <a:t>mutect.out</a:t>
+            </a:r>
+            <a:r>
+              <a:rPr lang="en-US" dirty="0" smtClean="0"/>
+              <a:t> file</a:t>
+            </a:r>
+            <a:endParaRPr lang="en-US" dirty="0"/>
+          </a:p>
+        </p:txBody>
+      </p:sp>
+      <p:sp>
+        <p:nvSpPr>
+          <p:cNvPr id="3" name="Content Placeholder 2"/>
+          <p:cNvSpPr>
+            <a:spLocks noGrp="1"/>
+          </p:cNvSpPr>
+          <p:nvPr>
+            <p:ph idx="1"/>
+          </p:nvPr>
+        </p:nvSpPr>
+        <p:spPr>
+          <a:xfrm>
+            <a:off x="457200" y="1600200"/>
+            <a:ext cx="8229600" cy="5257800"/>
+          </a:xfrm>
+        </p:spPr>
+        <p:txBody>
+          <a:bodyPr>
+            <a:normAutofit fontScale="40000" lnSpcReduction="20000"/>
+          </a:bodyPr>
+          <a:lstStyle/>
+          <a:p>
+            <a:pPr marL="0" indent="0">
+              <a:buNone/>
+            </a:pPr>
+            <a:r>
+              <a:rPr lang="en-US" sz="7000" dirty="0" smtClean="0"/>
+              <a:t>All statistics used in post-detection filtering</a:t>
+            </a:r>
+          </a:p>
+          <a:p>
+            <a:pPr marL="0" indent="0">
+              <a:buNone/>
+            </a:pPr>
+            <a:endParaRPr lang="en-US" dirty="0"/>
+          </a:p>
+          <a:p>
+            <a:pPr marL="0" indent="0">
+              <a:buNone/>
+            </a:pPr>
+            <a:r>
+              <a:rPr lang="en-US" sz="5000" dirty="0" smtClean="0"/>
+              <a:t>Columns:</a:t>
+            </a:r>
+          </a:p>
+          <a:p>
+            <a:pPr marL="0" indent="0">
+              <a:buNone/>
+            </a:pPr>
+            <a:r>
+              <a:rPr lang="en-US" dirty="0" err="1"/>
+              <a:t>contig</a:t>
+            </a:r>
+            <a:r>
+              <a:rPr lang="en-US" dirty="0"/>
+              <a:t>  position        context </a:t>
+            </a:r>
+            <a:r>
+              <a:rPr lang="en-US" dirty="0" err="1"/>
+              <a:t>ref_allele</a:t>
+            </a:r>
+            <a:r>
+              <a:rPr lang="en-US" dirty="0"/>
+              <a:t>      </a:t>
+            </a:r>
+            <a:r>
+              <a:rPr lang="en-US" dirty="0" err="1"/>
+              <a:t>alt_allele</a:t>
+            </a:r>
+            <a:r>
+              <a:rPr lang="en-US" dirty="0"/>
+              <a:t>      </a:t>
+            </a:r>
+            <a:r>
+              <a:rPr lang="en-US" dirty="0" err="1"/>
+              <a:t>tumor_name</a:t>
+            </a:r>
+            <a:r>
+              <a:rPr lang="en-US" dirty="0"/>
+              <a:t>      </a:t>
+            </a:r>
+            <a:r>
+              <a:rPr lang="en-US" dirty="0" err="1"/>
+              <a:t>normal_name</a:t>
+            </a:r>
+            <a:r>
+              <a:rPr lang="en-US" dirty="0"/>
+              <a:t>     score   </a:t>
+            </a:r>
+            <a:r>
+              <a:rPr lang="en-US" dirty="0" err="1"/>
+              <a:t>dbsnp_site</a:t>
+            </a:r>
+            <a:r>
+              <a:rPr lang="en-US" dirty="0"/>
+              <a:t>      covered</a:t>
+            </a:r>
+          </a:p>
+          <a:p>
+            <a:pPr marL="0" indent="0">
+              <a:buNone/>
+            </a:pPr>
+            <a:r>
+              <a:rPr lang="en-US" dirty="0"/>
+              <a:t>        power   </a:t>
+            </a:r>
+            <a:r>
+              <a:rPr lang="en-US" dirty="0" err="1"/>
+              <a:t>tumor_power</a:t>
+            </a:r>
+            <a:r>
+              <a:rPr lang="en-US" dirty="0"/>
+              <a:t>     </a:t>
+            </a:r>
+            <a:r>
+              <a:rPr lang="en-US" dirty="0" err="1"/>
+              <a:t>normal_power</a:t>
+            </a:r>
+            <a:r>
+              <a:rPr lang="en-US" dirty="0"/>
+              <a:t>    </a:t>
+            </a:r>
+            <a:r>
+              <a:rPr lang="en-US" dirty="0" err="1"/>
+              <a:t>normal_power_nsp</a:t>
+            </a:r>
+            <a:r>
+              <a:rPr lang="en-US" dirty="0"/>
+              <a:t>        </a:t>
+            </a:r>
+            <a:r>
+              <a:rPr lang="en-US" dirty="0" err="1"/>
+              <a:t>normal_power_wsp</a:t>
+            </a:r>
+            <a:r>
+              <a:rPr lang="en-US" dirty="0"/>
+              <a:t>        </a:t>
+            </a:r>
+            <a:r>
+              <a:rPr lang="en-US" dirty="0" err="1"/>
+              <a:t>total_reads</a:t>
+            </a:r>
+            <a:r>
+              <a:rPr lang="en-US" dirty="0"/>
+              <a:t>     map_Q0_reads  </a:t>
+            </a:r>
+            <a:r>
+              <a:rPr lang="en-US" dirty="0" err="1"/>
+              <a:t>init_t_lod</a:t>
+            </a:r>
+            <a:r>
+              <a:rPr lang="en-US" dirty="0"/>
+              <a:t>       </a:t>
+            </a:r>
+            <a:r>
+              <a:rPr lang="en-US" dirty="0" err="1"/>
+              <a:t>t_lod_fstar</a:t>
+            </a:r>
+            <a:r>
+              <a:rPr lang="en-US" dirty="0"/>
+              <a:t>     </a:t>
+            </a:r>
+            <a:r>
+              <a:rPr lang="en-US" dirty="0" err="1"/>
+              <a:t>t_lod_fstar_forward</a:t>
+            </a:r>
+            <a:r>
+              <a:rPr lang="en-US" dirty="0"/>
+              <a:t>     </a:t>
+            </a:r>
+            <a:r>
+              <a:rPr lang="en-US" dirty="0" err="1"/>
+              <a:t>t_lod_fstar_reverse</a:t>
+            </a:r>
+            <a:r>
+              <a:rPr lang="en-US" dirty="0"/>
+              <a:t>     </a:t>
+            </a:r>
+            <a:r>
+              <a:rPr lang="en-US" dirty="0" err="1"/>
+              <a:t>tumor_f</a:t>
+            </a:r>
+            <a:r>
+              <a:rPr lang="en-US" dirty="0"/>
+              <a:t> </a:t>
+            </a:r>
+            <a:r>
+              <a:rPr lang="en-US" dirty="0" err="1"/>
+              <a:t>contaminant_fraction</a:t>
+            </a:r>
+            <a:r>
+              <a:rPr lang="en-US" dirty="0"/>
+              <a:t>    </a:t>
+            </a:r>
+            <a:r>
+              <a:rPr lang="en-US" dirty="0" err="1"/>
+              <a:t>contaminant_lod</a:t>
+            </a:r>
+            <a:endParaRPr lang="en-US" dirty="0"/>
+          </a:p>
+          <a:p>
+            <a:pPr marL="0" indent="0">
+              <a:buNone/>
+            </a:pPr>
+            <a:r>
+              <a:rPr lang="en-US" dirty="0"/>
+              <a:t>        t_q20_count     </a:t>
+            </a:r>
+            <a:r>
+              <a:rPr lang="en-US" dirty="0" err="1"/>
+              <a:t>t_ref_count</a:t>
+            </a:r>
+            <a:r>
+              <a:rPr lang="en-US" dirty="0"/>
+              <a:t>     </a:t>
+            </a:r>
+            <a:r>
+              <a:rPr lang="en-US" dirty="0" err="1"/>
+              <a:t>t_alt_count</a:t>
+            </a:r>
+            <a:r>
+              <a:rPr lang="en-US" dirty="0"/>
+              <a:t>     </a:t>
+            </a:r>
+            <a:r>
+              <a:rPr lang="en-US" dirty="0" err="1"/>
+              <a:t>t_ref_sum</a:t>
+            </a:r>
+            <a:r>
+              <a:rPr lang="en-US" dirty="0"/>
+              <a:t>       </a:t>
+            </a:r>
+            <a:r>
+              <a:rPr lang="en-US" dirty="0" err="1"/>
+              <a:t>t_alt_sum</a:t>
+            </a:r>
+            <a:r>
+              <a:rPr lang="en-US" dirty="0"/>
+              <a:t>       </a:t>
+            </a:r>
+            <a:r>
+              <a:rPr lang="en-US" dirty="0" err="1"/>
+              <a:t>t_ref_max_mapq</a:t>
+            </a:r>
+            <a:r>
+              <a:rPr lang="en-US" dirty="0"/>
+              <a:t>  </a:t>
+            </a:r>
+            <a:r>
+              <a:rPr lang="en-US" dirty="0" err="1"/>
+              <a:t>t_alt_max_mapq</a:t>
+            </a:r>
+            <a:r>
+              <a:rPr lang="en-US" dirty="0"/>
+              <a:t>  </a:t>
+            </a:r>
+            <a:r>
+              <a:rPr lang="en-US" dirty="0" err="1"/>
+              <a:t>t_ins_c</a:t>
+            </a:r>
+            <a:endParaRPr lang="en-US" dirty="0"/>
+          </a:p>
+          <a:p>
+            <a:pPr marL="0" indent="0">
+              <a:buNone/>
+            </a:pPr>
+            <a:r>
+              <a:rPr lang="en-US" dirty="0" err="1"/>
+              <a:t>ount</a:t>
+            </a:r>
+            <a:r>
+              <a:rPr lang="en-US" dirty="0"/>
+              <a:t>    </a:t>
+            </a:r>
+            <a:r>
+              <a:rPr lang="en-US" dirty="0" err="1"/>
+              <a:t>t_del_count</a:t>
+            </a:r>
+            <a:r>
+              <a:rPr lang="en-US" dirty="0"/>
+              <a:t>     </a:t>
+            </a:r>
+            <a:r>
+              <a:rPr lang="en-US" dirty="0" err="1"/>
+              <a:t>normal_best_gt</a:t>
+            </a:r>
+            <a:r>
+              <a:rPr lang="en-US" dirty="0"/>
+              <a:t>  </a:t>
+            </a:r>
+            <a:r>
+              <a:rPr lang="en-US" dirty="0" err="1"/>
+              <a:t>init_n_lod</a:t>
+            </a:r>
+            <a:r>
+              <a:rPr lang="en-US" dirty="0"/>
+              <a:t>      </a:t>
+            </a:r>
+            <a:r>
+              <a:rPr lang="en-US" dirty="0" err="1"/>
+              <a:t>normal_f</a:t>
+            </a:r>
+            <a:r>
+              <a:rPr lang="en-US" dirty="0"/>
+              <a:t>        n_q20_count     </a:t>
+            </a:r>
+            <a:r>
+              <a:rPr lang="en-US" dirty="0" err="1"/>
+              <a:t>n_ref_count</a:t>
+            </a:r>
+            <a:r>
+              <a:rPr lang="en-US" dirty="0"/>
+              <a:t>     </a:t>
+            </a:r>
+            <a:r>
+              <a:rPr lang="en-US" dirty="0" err="1"/>
+              <a:t>n_alt_count</a:t>
+            </a:r>
+            <a:r>
+              <a:rPr lang="en-US" dirty="0"/>
+              <a:t>     </a:t>
+            </a:r>
+            <a:r>
+              <a:rPr lang="en-US" dirty="0" err="1"/>
+              <a:t>n_ref_s</a:t>
+            </a:r>
+            <a:endParaRPr lang="en-US" dirty="0"/>
+          </a:p>
+          <a:p>
+            <a:pPr marL="0" indent="0">
+              <a:buNone/>
+            </a:pPr>
+            <a:r>
+              <a:rPr lang="en-US" dirty="0"/>
+              <a:t>um      </a:t>
+            </a:r>
+            <a:r>
+              <a:rPr lang="en-US" dirty="0" err="1"/>
+              <a:t>n_alt_sum</a:t>
+            </a:r>
+            <a:r>
+              <a:rPr lang="en-US" dirty="0"/>
+              <a:t>       </a:t>
+            </a:r>
+            <a:r>
+              <a:rPr lang="en-US" dirty="0" err="1"/>
+              <a:t>power_to_detect_positive_strand_artifact</a:t>
+            </a:r>
+            <a:r>
+              <a:rPr lang="en-US" dirty="0"/>
+              <a:t>        </a:t>
+            </a:r>
+            <a:r>
+              <a:rPr lang="en-US" dirty="0" err="1"/>
+              <a:t>power_to_detect_negative_strand_artifact</a:t>
+            </a:r>
+            <a:r>
+              <a:rPr lang="en-US" dirty="0"/>
+              <a:t>        strand_</a:t>
+            </a:r>
+          </a:p>
+          <a:p>
+            <a:pPr marL="0" indent="0">
+              <a:buNone/>
+            </a:pPr>
+            <a:r>
+              <a:rPr lang="en-US" dirty="0" err="1"/>
+              <a:t>bias_counts</a:t>
+            </a:r>
+            <a:r>
+              <a:rPr lang="en-US" dirty="0"/>
+              <a:t>     </a:t>
+            </a:r>
+            <a:r>
+              <a:rPr lang="en-US" dirty="0" err="1"/>
+              <a:t>tumor_alt_fpir_median</a:t>
+            </a:r>
+            <a:r>
+              <a:rPr lang="en-US" dirty="0"/>
+              <a:t>   </a:t>
+            </a:r>
+            <a:r>
+              <a:rPr lang="en-US" dirty="0" err="1"/>
+              <a:t>tumor_alt_fpir_mad</a:t>
+            </a:r>
+            <a:r>
+              <a:rPr lang="en-US" dirty="0"/>
+              <a:t>      </a:t>
+            </a:r>
+            <a:r>
+              <a:rPr lang="en-US" dirty="0" err="1"/>
+              <a:t>tumor_alt_rpir_median</a:t>
+            </a:r>
+            <a:r>
+              <a:rPr lang="en-US" dirty="0"/>
+              <a:t>   </a:t>
+            </a:r>
+            <a:r>
+              <a:rPr lang="en-US" dirty="0" err="1"/>
+              <a:t>tumor_alt_rpir_mad</a:t>
+            </a:r>
+            <a:r>
+              <a:rPr lang="en-US" dirty="0"/>
+              <a:t>      </a:t>
+            </a:r>
+            <a:r>
+              <a:rPr lang="en-US" dirty="0" err="1"/>
+              <a:t>observed_in_nor</a:t>
+            </a:r>
+            <a:endParaRPr lang="en-US" dirty="0"/>
+          </a:p>
+          <a:p>
+            <a:pPr marL="0" indent="0">
+              <a:buNone/>
+            </a:pPr>
+            <a:r>
+              <a:rPr lang="en-US" dirty="0" err="1"/>
+              <a:t>mals_count</a:t>
+            </a:r>
+            <a:r>
+              <a:rPr lang="en-US" dirty="0"/>
+              <a:t>      </a:t>
+            </a:r>
+            <a:r>
+              <a:rPr lang="en-US" dirty="0" err="1"/>
+              <a:t>failure_reasons</a:t>
+            </a:r>
+            <a:r>
+              <a:rPr lang="en-US" dirty="0"/>
+              <a:t> </a:t>
+            </a:r>
+            <a:r>
+              <a:rPr lang="en-US" dirty="0" err="1" smtClean="0"/>
+              <a:t>judgement</a:t>
+            </a:r>
+            <a:endParaRPr lang="en-US" dirty="0" smtClean="0"/>
+          </a:p>
+          <a:p>
+            <a:pPr marL="0" indent="0">
+              <a:buNone/>
+            </a:pPr>
+            <a:endParaRPr lang="en-US" dirty="0" smtClean="0"/>
+          </a:p>
+          <a:p>
+            <a:pPr marL="0" indent="0">
+              <a:buNone/>
+            </a:pPr>
+            <a:r>
+              <a:rPr lang="en-US" sz="5000" dirty="0" smtClean="0"/>
+              <a:t>Example row:</a:t>
+            </a:r>
+            <a:endParaRPr lang="en-US" sz="5000" dirty="0"/>
+          </a:p>
+          <a:p>
+            <a:pPr marL="0" indent="0">
+              <a:buNone/>
+            </a:pPr>
+            <a:r>
+              <a:rPr lang="en-US" dirty="0"/>
+              <a:t>17      1001315 </a:t>
+            </a:r>
+            <a:r>
+              <a:rPr lang="en-US" dirty="0" err="1"/>
+              <a:t>TTTxTTT</a:t>
+            </a:r>
+            <a:r>
+              <a:rPr lang="en-US" dirty="0"/>
+              <a:t> C       T       HCC1143.tumor   HCC1143.normal  0       DBSNP   COVERED 0.954491        0.954491      11       1       103     0       -3.640633       2.499583        0       3.065049        0.064516        0.02    -0.4105</a:t>
+            </a:r>
+          </a:p>
+          <a:p>
+            <a:pPr marL="0" indent="0">
+              <a:buNone/>
+            </a:pPr>
+            <a:r>
+              <a:rPr lang="en-US" dirty="0"/>
+              <a:t>76      41      29      2       893     47      70      70      0       6       CC      5.640677        0.055556        47    51       3       1476    91      0.560361        0.544179        (15,14,0,2)     2.5     0.5     83.5    8.5     0       </a:t>
+            </a:r>
+            <a:r>
+              <a:rPr lang="en-US" dirty="0" err="1"/>
+              <a:t>fstar_t</a:t>
+            </a:r>
+            <a:endParaRPr lang="en-US" dirty="0"/>
+          </a:p>
+          <a:p>
+            <a:pPr marL="0" indent="0">
+              <a:buNone/>
+            </a:pPr>
+            <a:r>
+              <a:rPr lang="en-US" dirty="0"/>
+              <a:t>umor_lod,nearby_gap_events,possible_contamination,alt_allele_in_normal,clustered_read_position  REJECT</a:t>
+            </a:r>
+          </a:p>
+          <a:p>
+            <a:pPr marL="0" indent="0">
+              <a:buNone/>
+            </a:pPr>
+            <a:endParaRPr lang="en-US" dirty="0"/>
+          </a:p>
+        </p:txBody>
+      </p:sp>
+    </p:spTree>
+    <p:extLst>
+      <p:ext uri="{BB962C8B-B14F-4D97-AF65-F5344CB8AC3E}">
+        <p14:creationId xmlns:p14="http://schemas.microsoft.com/office/powerpoint/2010/main" val="2398225781"/>
       </p:ext>
     </p:extLst>
   </p:cSld>
@@ -11021,12 +11480,8 @@
           <a:lstStyle/>
           <a:p>
             <a:r>
-              <a:rPr lang="en-US" dirty="0" err="1" smtClean="0"/>
-              <a:t>mutect.out</a:t>
-            </a:r>
-            <a:r>
               <a:rPr lang="en-US" dirty="0" smtClean="0"/>
-              <a:t> file</a:t>
+              <a:t>Annotation</a:t>
             </a:r>
             <a:endParaRPr lang="en-US" dirty="0"/>
           </a:p>
@@ -11044,13 +11499,13 @@
         </p:nvSpPr>
         <p:spPr>
           <a:xfrm>
-            <a:off x="457200" y="1600200"/>
-            <a:ext cx="8229600" cy="5257800"/>
+            <a:off x="1051997" y="1600200"/>
+            <a:ext cx="7500220" cy="4525963"/>
           </a:xfrm>
         </p:spPr>
         <p:txBody>
           <a:bodyPr>
-            <a:normAutofit fontScale="40000" lnSpcReduction="20000"/>
+            <a:normAutofit/>
           </a:bodyPr>
           <a:lstStyle/>
           <a:p>
@@ -11058,485 +11513,67 @@
               <a:buNone/>
             </a:pPr>
             <a:r>
-              <a:rPr lang="en-US" sz="7000" dirty="0" smtClean="0"/>
-              <a:t>All statistics used in post-detection filtering</a:t>
-            </a:r>
-          </a:p>
-          <a:p>
-            <a:pPr marL="0" indent="0">
-              <a:buNone/>
-            </a:pPr>
-            <a:endParaRPr lang="en-US" dirty="0"/>
-          </a:p>
-          <a:p>
-            <a:pPr marL="0" indent="0">
-              <a:buNone/>
-            </a:pPr>
-            <a:r>
-              <a:rPr lang="en-US" sz="5000" dirty="0" smtClean="0"/>
-              <a:t>Columns:</a:t>
-            </a:r>
-          </a:p>
-          <a:p>
-            <a:pPr marL="0" indent="0">
-              <a:buNone/>
-            </a:pPr>
-            <a:r>
-              <a:rPr lang="en-US" dirty="0" err="1"/>
-              <a:t>contig</a:t>
-            </a:r>
-            <a:r>
-              <a:rPr lang="en-US" dirty="0"/>
-              <a:t>  position        context </a:t>
-            </a:r>
-            <a:r>
-              <a:rPr lang="en-US" dirty="0" err="1"/>
-              <a:t>ref_allele</a:t>
-            </a:r>
-            <a:r>
-              <a:rPr lang="en-US" dirty="0"/>
-              <a:t>      </a:t>
-            </a:r>
-            <a:r>
-              <a:rPr lang="en-US" dirty="0" err="1"/>
-              <a:t>alt_allele</a:t>
-            </a:r>
-            <a:r>
-              <a:rPr lang="en-US" dirty="0"/>
-              <a:t>      </a:t>
-            </a:r>
-            <a:r>
-              <a:rPr lang="en-US" dirty="0" err="1"/>
-              <a:t>tumor_name</a:t>
-            </a:r>
-            <a:r>
-              <a:rPr lang="en-US" dirty="0"/>
-              <a:t>      </a:t>
-            </a:r>
-            <a:r>
-              <a:rPr lang="en-US" dirty="0" err="1"/>
-              <a:t>normal_name</a:t>
-            </a:r>
-            <a:r>
-              <a:rPr lang="en-US" dirty="0"/>
-              <a:t>     score   </a:t>
-            </a:r>
-            <a:r>
-              <a:rPr lang="en-US" dirty="0" err="1"/>
-              <a:t>dbsnp_site</a:t>
-            </a:r>
-            <a:r>
-              <a:rPr lang="en-US" dirty="0"/>
-              <a:t>      covered</a:t>
-            </a:r>
-          </a:p>
-          <a:p>
-            <a:pPr marL="0" indent="0">
-              <a:buNone/>
-            </a:pPr>
-            <a:r>
-              <a:rPr lang="en-US" dirty="0"/>
-              <a:t>        power   </a:t>
-            </a:r>
-            <a:r>
-              <a:rPr lang="en-US" dirty="0" err="1"/>
-              <a:t>tumor_power</a:t>
-            </a:r>
-            <a:r>
-              <a:rPr lang="en-US" dirty="0"/>
-              <a:t>     </a:t>
-            </a:r>
-            <a:r>
-              <a:rPr lang="en-US" dirty="0" err="1"/>
-              <a:t>normal_power</a:t>
-            </a:r>
-            <a:r>
-              <a:rPr lang="en-US" dirty="0"/>
-              <a:t>    </a:t>
-            </a:r>
-            <a:r>
-              <a:rPr lang="en-US" dirty="0" err="1"/>
-              <a:t>normal_power_nsp</a:t>
-            </a:r>
-            <a:r>
-              <a:rPr lang="en-US" dirty="0"/>
-              <a:t>        </a:t>
-            </a:r>
-            <a:r>
-              <a:rPr lang="en-US" dirty="0" err="1"/>
-              <a:t>normal_power_wsp</a:t>
-            </a:r>
-            <a:r>
-              <a:rPr lang="en-US" dirty="0"/>
-              <a:t>        </a:t>
-            </a:r>
-            <a:r>
-              <a:rPr lang="en-US" dirty="0" err="1"/>
-              <a:t>total_reads</a:t>
-            </a:r>
-            <a:r>
-              <a:rPr lang="en-US" dirty="0"/>
-              <a:t>     map_Q0_reads  </a:t>
-            </a:r>
-            <a:r>
-              <a:rPr lang="en-US" dirty="0" err="1"/>
-              <a:t>init_t_lod</a:t>
-            </a:r>
-            <a:r>
-              <a:rPr lang="en-US" dirty="0"/>
-              <a:t>       </a:t>
-            </a:r>
-            <a:r>
-              <a:rPr lang="en-US" dirty="0" err="1"/>
-              <a:t>t_lod_fstar</a:t>
-            </a:r>
-            <a:r>
-              <a:rPr lang="en-US" dirty="0"/>
-              <a:t>     </a:t>
-            </a:r>
-            <a:r>
-              <a:rPr lang="en-US" dirty="0" err="1"/>
-              <a:t>t_lod_fstar_forward</a:t>
-            </a:r>
-            <a:r>
-              <a:rPr lang="en-US" dirty="0"/>
-              <a:t>     </a:t>
-            </a:r>
-            <a:r>
-              <a:rPr lang="en-US" dirty="0" err="1"/>
-              <a:t>t_lod_fstar_reverse</a:t>
-            </a:r>
-            <a:r>
-              <a:rPr lang="en-US" dirty="0"/>
-              <a:t>     </a:t>
-            </a:r>
-            <a:r>
-              <a:rPr lang="en-US" dirty="0" err="1"/>
-              <a:t>tumor_f</a:t>
-            </a:r>
-            <a:r>
-              <a:rPr lang="en-US" dirty="0"/>
-              <a:t> </a:t>
-            </a:r>
-            <a:r>
-              <a:rPr lang="en-US" dirty="0" err="1"/>
-              <a:t>contaminant_fraction</a:t>
-            </a:r>
-            <a:r>
-              <a:rPr lang="en-US" dirty="0"/>
-              <a:t>    </a:t>
-            </a:r>
-            <a:r>
-              <a:rPr lang="en-US" dirty="0" err="1"/>
-              <a:t>contaminant_lod</a:t>
-            </a:r>
-            <a:endParaRPr lang="en-US" dirty="0"/>
-          </a:p>
-          <a:p>
-            <a:pPr marL="0" indent="0">
-              <a:buNone/>
-            </a:pPr>
-            <a:r>
-              <a:rPr lang="en-US" dirty="0"/>
-              <a:t>        t_q20_count     </a:t>
-            </a:r>
-            <a:r>
-              <a:rPr lang="en-US" dirty="0" err="1"/>
-              <a:t>t_ref_count</a:t>
-            </a:r>
-            <a:r>
-              <a:rPr lang="en-US" dirty="0"/>
-              <a:t>     </a:t>
-            </a:r>
-            <a:r>
-              <a:rPr lang="en-US" dirty="0" err="1"/>
-              <a:t>t_alt_count</a:t>
-            </a:r>
-            <a:r>
-              <a:rPr lang="en-US" dirty="0"/>
-              <a:t>     </a:t>
-            </a:r>
-            <a:r>
-              <a:rPr lang="en-US" dirty="0" err="1"/>
-              <a:t>t_ref_sum</a:t>
-            </a:r>
-            <a:r>
-              <a:rPr lang="en-US" dirty="0"/>
-              <a:t>       </a:t>
-            </a:r>
-            <a:r>
-              <a:rPr lang="en-US" dirty="0" err="1"/>
-              <a:t>t_alt_sum</a:t>
-            </a:r>
-            <a:r>
-              <a:rPr lang="en-US" dirty="0"/>
-              <a:t>       </a:t>
-            </a:r>
-            <a:r>
-              <a:rPr lang="en-US" dirty="0" err="1"/>
-              <a:t>t_ref_max_mapq</a:t>
-            </a:r>
-            <a:r>
-              <a:rPr lang="en-US" dirty="0"/>
-              <a:t>  </a:t>
-            </a:r>
-            <a:r>
-              <a:rPr lang="en-US" dirty="0" err="1"/>
-              <a:t>t_alt_max_mapq</a:t>
-            </a:r>
-            <a:r>
-              <a:rPr lang="en-US" dirty="0"/>
-              <a:t>  </a:t>
-            </a:r>
-            <a:r>
-              <a:rPr lang="en-US" dirty="0" err="1"/>
-              <a:t>t_ins_c</a:t>
-            </a:r>
-            <a:endParaRPr lang="en-US" dirty="0"/>
-          </a:p>
-          <a:p>
-            <a:pPr marL="0" indent="0">
-              <a:buNone/>
-            </a:pPr>
-            <a:r>
-              <a:rPr lang="en-US" dirty="0" err="1"/>
-              <a:t>ount</a:t>
-            </a:r>
-            <a:r>
-              <a:rPr lang="en-US" dirty="0"/>
-              <a:t>    </a:t>
-            </a:r>
-            <a:r>
-              <a:rPr lang="en-US" dirty="0" err="1"/>
-              <a:t>t_del_count</a:t>
-            </a:r>
-            <a:r>
-              <a:rPr lang="en-US" dirty="0"/>
-              <a:t>     </a:t>
-            </a:r>
-            <a:r>
-              <a:rPr lang="en-US" dirty="0" err="1"/>
-              <a:t>normal_best_gt</a:t>
-            </a:r>
-            <a:r>
-              <a:rPr lang="en-US" dirty="0"/>
-              <a:t>  </a:t>
-            </a:r>
-            <a:r>
-              <a:rPr lang="en-US" dirty="0" err="1"/>
-              <a:t>init_n_lod</a:t>
-            </a:r>
-            <a:r>
-              <a:rPr lang="en-US" dirty="0"/>
-              <a:t>      </a:t>
-            </a:r>
-            <a:r>
-              <a:rPr lang="en-US" dirty="0" err="1"/>
-              <a:t>normal_f</a:t>
-            </a:r>
-            <a:r>
-              <a:rPr lang="en-US" dirty="0"/>
-              <a:t>        n_q20_count     </a:t>
-            </a:r>
-            <a:r>
-              <a:rPr lang="en-US" dirty="0" err="1"/>
-              <a:t>n_ref_count</a:t>
-            </a:r>
-            <a:r>
-              <a:rPr lang="en-US" dirty="0"/>
-              <a:t>     </a:t>
-            </a:r>
-            <a:r>
-              <a:rPr lang="en-US" dirty="0" err="1"/>
-              <a:t>n_alt_count</a:t>
-            </a:r>
-            <a:r>
-              <a:rPr lang="en-US" dirty="0"/>
-              <a:t>     </a:t>
-            </a:r>
-            <a:r>
-              <a:rPr lang="en-US" dirty="0" err="1"/>
-              <a:t>n_ref_s</a:t>
-            </a:r>
-            <a:endParaRPr lang="en-US" dirty="0"/>
-          </a:p>
-          <a:p>
-            <a:pPr marL="0" indent="0">
-              <a:buNone/>
-            </a:pPr>
-            <a:r>
-              <a:rPr lang="en-US" dirty="0"/>
-              <a:t>um      </a:t>
-            </a:r>
-            <a:r>
-              <a:rPr lang="en-US" dirty="0" err="1"/>
-              <a:t>n_alt_sum</a:t>
-            </a:r>
-            <a:r>
-              <a:rPr lang="en-US" dirty="0"/>
-              <a:t>       </a:t>
-            </a:r>
-            <a:r>
-              <a:rPr lang="en-US" dirty="0" err="1"/>
-              <a:t>power_to_detect_positive_strand_artifact</a:t>
-            </a:r>
-            <a:r>
-              <a:rPr lang="en-US" dirty="0"/>
-              <a:t>        </a:t>
-            </a:r>
-            <a:r>
-              <a:rPr lang="en-US" dirty="0" err="1"/>
-              <a:t>power_to_detect_negative_strand_artifact</a:t>
-            </a:r>
-            <a:r>
-              <a:rPr lang="en-US" dirty="0"/>
-              <a:t>        strand_</a:t>
-            </a:r>
-          </a:p>
-          <a:p>
-            <a:pPr marL="0" indent="0">
-              <a:buNone/>
-            </a:pPr>
-            <a:r>
-              <a:rPr lang="en-US" dirty="0" err="1"/>
-              <a:t>bias_counts</a:t>
-            </a:r>
-            <a:r>
-              <a:rPr lang="en-US" dirty="0"/>
-              <a:t>     </a:t>
-            </a:r>
-            <a:r>
-              <a:rPr lang="en-US" dirty="0" err="1"/>
-              <a:t>tumor_alt_fpir_median</a:t>
-            </a:r>
-            <a:r>
-              <a:rPr lang="en-US" dirty="0"/>
-              <a:t>   </a:t>
-            </a:r>
-            <a:r>
-              <a:rPr lang="en-US" dirty="0" err="1"/>
-              <a:t>tumor_alt_fpir_mad</a:t>
-            </a:r>
-            <a:r>
-              <a:rPr lang="en-US" dirty="0"/>
-              <a:t>      </a:t>
-            </a:r>
-            <a:r>
-              <a:rPr lang="en-US" dirty="0" err="1"/>
-              <a:t>tumor_alt_rpir_median</a:t>
-            </a:r>
-            <a:r>
-              <a:rPr lang="en-US" dirty="0"/>
-              <a:t>   </a:t>
-            </a:r>
-            <a:r>
-              <a:rPr lang="en-US" dirty="0" err="1"/>
-              <a:t>tumor_alt_rpir_mad</a:t>
-            </a:r>
-            <a:r>
-              <a:rPr lang="en-US" dirty="0"/>
-              <a:t>      </a:t>
-            </a:r>
-            <a:r>
-              <a:rPr lang="en-US" dirty="0" err="1"/>
-              <a:t>observed_in_nor</a:t>
-            </a:r>
-            <a:endParaRPr lang="en-US" dirty="0"/>
-          </a:p>
-          <a:p>
-            <a:pPr marL="0" indent="0">
-              <a:buNone/>
-            </a:pPr>
-            <a:r>
-              <a:rPr lang="en-US" dirty="0" err="1"/>
-              <a:t>mals_count</a:t>
-            </a:r>
-            <a:r>
-              <a:rPr lang="en-US" dirty="0"/>
-              <a:t>      </a:t>
-            </a:r>
-            <a:r>
-              <a:rPr lang="en-US" dirty="0" err="1"/>
-              <a:t>failure_reasons</a:t>
-            </a:r>
-            <a:r>
-              <a:rPr lang="en-US" dirty="0"/>
-              <a:t> </a:t>
-            </a:r>
-            <a:r>
-              <a:rPr lang="en-US" dirty="0" err="1" smtClean="0"/>
-              <a:t>judgement</a:t>
-            </a:r>
-            <a:endParaRPr lang="en-US" dirty="0" smtClean="0"/>
-          </a:p>
-          <a:p>
-            <a:pPr marL="0" indent="0">
-              <a:buNone/>
-            </a:pPr>
-            <a:endParaRPr lang="en-US" dirty="0" smtClean="0"/>
-          </a:p>
-          <a:p>
-            <a:pPr marL="0" indent="0">
-              <a:buNone/>
-            </a:pPr>
-            <a:r>
-              <a:rPr lang="en-US" sz="5000" dirty="0" smtClean="0"/>
-              <a:t>Example row:</a:t>
-            </a:r>
-            <a:endParaRPr lang="en-US" sz="5000" dirty="0"/>
-          </a:p>
-          <a:p>
-            <a:pPr marL="0" indent="0">
-              <a:buNone/>
-            </a:pPr>
-            <a:r>
-              <a:rPr lang="en-US" dirty="0"/>
-              <a:t>17      1001315 </a:t>
-            </a:r>
-            <a:r>
-              <a:rPr lang="en-US" dirty="0" err="1"/>
-              <a:t>TTTxTTT</a:t>
-            </a:r>
-            <a:r>
-              <a:rPr lang="en-US" dirty="0"/>
-              <a:t> C       T       HCC1143.tumor   HCC1143.normal  0       DBSNP   COVERED 0.954491        0.954491      11       1       103     0       -3.640633       2.499583        0       3.065049        0.064516        0.02    -0.4105</a:t>
-            </a:r>
-          </a:p>
-          <a:p>
-            <a:pPr marL="0" indent="0">
-              <a:buNone/>
-            </a:pPr>
-            <a:r>
-              <a:rPr lang="en-US" dirty="0"/>
-              <a:t>76      41      29      2       893     47      70      70      0       6       CC      5.640677        0.055556        47    51       3       1476    91      0.560361        0.544179        (15,14,0,2)     2.5     0.5     83.5    8.5     0       </a:t>
-            </a:r>
-            <a:r>
-              <a:rPr lang="en-US" dirty="0" err="1"/>
-              <a:t>fstar_t</a:t>
-            </a:r>
-            <a:endParaRPr lang="en-US" dirty="0"/>
-          </a:p>
-          <a:p>
-            <a:pPr marL="0" indent="0">
-              <a:buNone/>
-            </a:pPr>
-            <a:r>
-              <a:rPr lang="en-US" dirty="0"/>
-              <a:t>umor_lod,nearby_gap_events,possible_contamination,alt_allele_in_normal,clustered_read_position  REJECT</a:t>
-            </a:r>
-          </a:p>
-          <a:p>
-            <a:pPr marL="0" indent="0">
-              <a:buNone/>
-            </a:pPr>
-            <a:endParaRPr lang="en-US" dirty="0"/>
+              <a:rPr lang="en-US" sz="2800" dirty="0" smtClean="0"/>
+              <a:t>Link detected variants to functional sites in the genome</a:t>
+            </a:r>
+          </a:p>
+          <a:p>
+            <a:r>
+              <a:rPr lang="en-US" sz="2800" dirty="0" smtClean="0"/>
+              <a:t>Protein coding exons</a:t>
+            </a:r>
+          </a:p>
+          <a:p>
+            <a:r>
+              <a:rPr lang="en-US" sz="2800" dirty="0" smtClean="0"/>
+              <a:t>UTR</a:t>
+            </a:r>
+          </a:p>
+          <a:p>
+            <a:r>
+              <a:rPr lang="en-US" sz="2800" dirty="0" smtClean="0"/>
+              <a:t>Regulatory regions</a:t>
+            </a:r>
+          </a:p>
+          <a:p>
+            <a:r>
+              <a:rPr lang="en-US" sz="2800" dirty="0" smtClean="0"/>
+              <a:t>Database of known variation</a:t>
+            </a:r>
+          </a:p>
+          <a:p>
+            <a:pPr lvl="1"/>
+            <a:r>
+              <a:rPr lang="en-US" sz="2400" dirty="0" err="1" smtClean="0"/>
+              <a:t>dbSNP</a:t>
+            </a:r>
+            <a:r>
+              <a:rPr lang="en-US" sz="2400" dirty="0" smtClean="0"/>
+              <a:t> / 1000 Genomes / </a:t>
+            </a:r>
+            <a:r>
+              <a:rPr lang="en-US" sz="2400" dirty="0" err="1" smtClean="0"/>
+              <a:t>ExAC</a:t>
+            </a:r>
+            <a:r>
+              <a:rPr lang="en-US" sz="2400" dirty="0" smtClean="0"/>
+              <a:t> for normal variants</a:t>
+            </a:r>
+          </a:p>
+          <a:p>
+            <a:pPr lvl="1"/>
+            <a:r>
+              <a:rPr lang="en-US" sz="2400" dirty="0" smtClean="0"/>
+              <a:t>Cosmic for cancer mutations</a:t>
+            </a:r>
+            <a:endParaRPr lang="en-US" sz="2400" dirty="0"/>
           </a:p>
         </p:txBody>
       </p:sp>
     </p:spTree>
     <p:extLst>
       <p:ext uri="{BB962C8B-B14F-4D97-AF65-F5344CB8AC3E}">
-        <p14:creationId xmlns:p14="http://schemas.microsoft.com/office/powerpoint/2010/main" val="2398225781"/>
+        <p14:creationId xmlns:p14="http://schemas.microsoft.com/office/powerpoint/2010/main" val="2215716068"/>
       </p:ext>
     </p:extLst>
   </p:cSld>
@@ -11582,149 +11619,6 @@
         </p:nvSpPr>
         <p:spPr/>
         <p:txBody>
-          <a:bodyPr/>
-          <a:lstStyle/>
-          <a:p>
-            <a:r>
-              <a:rPr lang="en-US" dirty="0" smtClean="0"/>
-              <a:t>Annotation</a:t>
-            </a:r>
-            <a:endParaRPr lang="en-US" dirty="0"/>
-          </a:p>
-        </p:txBody>
-      </p:sp>
-      <p:sp>
-        <p:nvSpPr>
-          <p:cNvPr id="3" name="Content Placeholder 2"/>
-          <p:cNvSpPr>
-            <a:spLocks noGrp="1"/>
-          </p:cNvSpPr>
-          <p:nvPr>
-            <p:ph idx="1"/>
-          </p:nvPr>
-        </p:nvSpPr>
-        <p:spPr>
-          <a:xfrm>
-            <a:off x="1051997" y="1600200"/>
-            <a:ext cx="7500220" cy="4525963"/>
-          </a:xfrm>
-        </p:spPr>
-        <p:txBody>
-          <a:bodyPr>
-            <a:normAutofit/>
-          </a:bodyPr>
-          <a:lstStyle/>
-          <a:p>
-            <a:pPr marL="0" indent="0">
-              <a:buNone/>
-            </a:pPr>
-            <a:r>
-              <a:rPr lang="en-US" sz="2800" dirty="0" smtClean="0"/>
-              <a:t>Link detected variants to functional sites in the genome</a:t>
-            </a:r>
-          </a:p>
-          <a:p>
-            <a:r>
-              <a:rPr lang="en-US" sz="2800" dirty="0" smtClean="0"/>
-              <a:t>Protein coding exons</a:t>
-            </a:r>
-          </a:p>
-          <a:p>
-            <a:r>
-              <a:rPr lang="en-US" sz="2800" dirty="0" smtClean="0"/>
-              <a:t>UTR</a:t>
-            </a:r>
-          </a:p>
-          <a:p>
-            <a:r>
-              <a:rPr lang="en-US" sz="2800" dirty="0" smtClean="0"/>
-              <a:t>Regulatory regions</a:t>
-            </a:r>
-          </a:p>
-          <a:p>
-            <a:r>
-              <a:rPr lang="en-US" sz="2800" dirty="0" smtClean="0"/>
-              <a:t>Database of known variation</a:t>
-            </a:r>
-          </a:p>
-          <a:p>
-            <a:pPr lvl="1"/>
-            <a:r>
-              <a:rPr lang="en-US" sz="2400" dirty="0" err="1" smtClean="0"/>
-              <a:t>dbSNP</a:t>
-            </a:r>
-            <a:r>
-              <a:rPr lang="en-US" sz="2400" dirty="0" smtClean="0"/>
-              <a:t> / 1000 Genomes / </a:t>
-            </a:r>
-            <a:r>
-              <a:rPr lang="en-US" sz="2400" dirty="0" err="1" smtClean="0"/>
-              <a:t>ExAC</a:t>
-            </a:r>
-            <a:r>
-              <a:rPr lang="en-US" sz="2400" dirty="0" smtClean="0"/>
-              <a:t> for normal variants</a:t>
-            </a:r>
-          </a:p>
-          <a:p>
-            <a:pPr lvl="1"/>
-            <a:r>
-              <a:rPr lang="en-US" sz="2400" dirty="0" smtClean="0"/>
-              <a:t>Cosmic for cancer mutations</a:t>
-            </a:r>
-            <a:endParaRPr lang="en-US" sz="2400" dirty="0"/>
-          </a:p>
-        </p:txBody>
-      </p:sp>
-    </p:spTree>
-    <p:extLst>
-      <p:ext uri="{BB962C8B-B14F-4D97-AF65-F5344CB8AC3E}">
-        <p14:creationId xmlns:p14="http://schemas.microsoft.com/office/powerpoint/2010/main" val="2215716068"/>
-      </p:ext>
-    </p:extLst>
-  </p:cSld>
-  <p:clrMapOvr>
-    <a:masterClrMapping/>
-  </p:clrMapOvr>
-  <p:timing>
-    <p:tnLst>
-      <p:par>
-        <p:cTn xmlns:p14="http://schemas.microsoft.com/office/powerpoint/2010/main" id="1" dur="indefinite" restart="never" nodeType="tmRoot"/>
-      </p:par>
-    </p:tnLst>
-  </p:timing>
-</p:sld>
-</file>
-
-<file path=ppt/slides/slide38.xml><?xml version="1.0" encoding="utf-8"?>
-<p:sld xmlns:a="http://schemas.openxmlformats.org/drawingml/2006/main" xmlns:r="http://schemas.openxmlformats.org/officeDocument/2006/relationships" xmlns:p="http://schemas.openxmlformats.org/presentationml/2006/main">
-  <p:cSld>
-    <p:spTree>
-      <p:nvGrpSpPr>
-        <p:cNvPr id="1" name=""/>
-        <p:cNvGrpSpPr/>
-        <p:nvPr/>
-      </p:nvGrpSpPr>
-      <p:grpSpPr>
-        <a:xfrm>
-          <a:off x="0" y="0"/>
-          <a:ext cx="0" cy="0"/>
-          <a:chOff x="0" y="0"/>
-          <a:chExt cx="0" cy="0"/>
-        </a:xfrm>
-      </p:grpSpPr>
-      <p:sp>
-        <p:nvSpPr>
-          <p:cNvPr id="2" name="Title 1"/>
-          <p:cNvSpPr>
-            <a:spLocks noGrp="1"/>
-          </p:cNvSpPr>
-          <p:nvPr>
-            <p:ph type="title"/>
-          </p:nvPr>
-        </p:nvSpPr>
-        <p:spPr/>
-        <p:txBody>
           <a:bodyPr>
             <a:normAutofit fontScale="90000"/>
           </a:bodyPr>
@@ -11884,7 +11778,7 @@
 </p:sld>
 </file>
 
-<file path=ppt/slides/slide39.xml><?xml version="1.0" encoding="utf-8"?>
+<file path=ppt/slides/slide38.xml><?xml version="1.0" encoding="utf-8"?>
 <p:sld xmlns:a="http://schemas.openxmlformats.org/drawingml/2006/main" xmlns:r="http://schemas.openxmlformats.org/officeDocument/2006/relationships" xmlns:p="http://schemas.openxmlformats.org/presentationml/2006/main">
   <p:cSld>
     <p:spTree>
@@ -12231,159 +12125,7 @@
 </p:sld>
 </file>
 
-<file path=ppt/slides/slide4.xml><?xml version="1.0" encoding="utf-8"?>
-<p:sld xmlns:a="http://schemas.openxmlformats.org/drawingml/2006/main" xmlns:r="http://schemas.openxmlformats.org/officeDocument/2006/relationships" xmlns:p="http://schemas.openxmlformats.org/presentationml/2006/main">
-  <p:cSld>
-    <p:spTree>
-      <p:nvGrpSpPr>
-        <p:cNvPr id="1" name=""/>
-        <p:cNvGrpSpPr/>
-        <p:nvPr/>
-      </p:nvGrpSpPr>
-      <p:grpSpPr>
-        <a:xfrm>
-          <a:off x="0" y="0"/>
-          <a:ext cx="0" cy="0"/>
-          <a:chOff x="0" y="0"/>
-          <a:chExt cx="0" cy="0"/>
-        </a:xfrm>
-      </p:grpSpPr>
-      <p:sp>
-        <p:nvSpPr>
-          <p:cNvPr id="2" name="Title 1"/>
-          <p:cNvSpPr>
-            <a:spLocks noGrp="1"/>
-          </p:cNvSpPr>
-          <p:nvPr>
-            <p:ph type="title"/>
-          </p:nvPr>
-        </p:nvSpPr>
-        <p:spPr/>
-        <p:txBody>
-          <a:bodyPr/>
-          <a:lstStyle/>
-          <a:p>
-            <a:r>
-              <a:rPr lang="en-US" dirty="0" smtClean="0"/>
-              <a:t>Somatic </a:t>
-            </a:r>
-            <a:r>
-              <a:rPr lang="en-US" dirty="0" err="1" smtClean="0"/>
-              <a:t>vs</a:t>
-            </a:r>
-            <a:r>
-              <a:rPr lang="en-US" dirty="0" smtClean="0"/>
-              <a:t> </a:t>
-            </a:r>
-            <a:r>
-              <a:rPr lang="en-US" dirty="0" err="1" smtClean="0"/>
-              <a:t>germline</a:t>
-            </a:r>
-            <a:r>
-              <a:rPr lang="en-US" dirty="0" smtClean="0"/>
-              <a:t> mutations</a:t>
-            </a:r>
-            <a:endParaRPr lang="en-US" dirty="0"/>
-          </a:p>
-        </p:txBody>
-      </p:sp>
-      <p:pic>
-        <p:nvPicPr>
-          <p:cNvPr id="8" name="Picture 7" descr="hosp-misc-ipactr6-1101.gif"/>
-          <p:cNvPicPr>
-            <a:picLocks noChangeAspect="1"/>
-          </p:cNvPicPr>
-          <p:nvPr/>
-        </p:nvPicPr>
-        <p:blipFill>
-          <a:blip r:embed="rId2">
-            <a:extLst>
-              <a:ext uri="{28A0092B-C50C-407E-A947-70E740481C1C}">
-                <a14:useLocalDpi xmlns:a14="http://schemas.microsoft.com/office/drawing/2010/main" val="0"/>
-              </a:ext>
-            </a:extLst>
-          </a:blip>
-          <a:stretch>
-            <a:fillRect/>
-          </a:stretch>
-        </p:blipFill>
-        <p:spPr>
-          <a:xfrm>
-            <a:off x="1714500" y="1793909"/>
-            <a:ext cx="5715000" cy="4318000"/>
-          </a:xfrm>
-          <a:prstGeom prst="rect">
-            <a:avLst/>
-          </a:prstGeom>
-        </p:spPr>
-      </p:pic>
-      <p:sp>
-        <p:nvSpPr>
-          <p:cNvPr id="9" name="Rectangle 8"/>
-          <p:cNvSpPr/>
-          <p:nvPr/>
-        </p:nvSpPr>
-        <p:spPr>
-          <a:xfrm>
-            <a:off x="2572837" y="5955787"/>
-            <a:ext cx="4161693" cy="461665"/>
-          </a:xfrm>
-          <a:prstGeom prst="rect">
-            <a:avLst/>
-          </a:prstGeom>
-          <a:solidFill>
-            <a:schemeClr val="bg1"/>
-          </a:solidFill>
-        </p:spPr>
-        <p:txBody>
-          <a:bodyPr wrap="square">
-            <a:spAutoFit/>
-          </a:bodyPr>
-          <a:lstStyle/>
-          <a:p>
-            <a:endParaRPr lang="en-US" sz="1200" dirty="0" smtClean="0"/>
-          </a:p>
-          <a:p>
-            <a:r>
-              <a:rPr lang="en-US" sz="1200" dirty="0" smtClean="0"/>
-              <a:t>https</a:t>
-            </a:r>
-            <a:r>
-              <a:rPr lang="en-US" sz="1200" dirty="0"/>
-              <a:t>://</a:t>
-            </a:r>
-            <a:r>
-              <a:rPr lang="en-US" sz="1200" dirty="0" err="1"/>
-              <a:t>www.stjude.org</a:t>
-            </a:r>
-            <a:r>
-              <a:rPr lang="en-US" sz="1200" dirty="0"/>
-              <a:t>/Images/hosp-misc-ipactr6-1101.gif</a:t>
-            </a:r>
-          </a:p>
-        </p:txBody>
-      </p:sp>
-    </p:spTree>
-    <p:extLst>
-      <p:ext uri="{BB962C8B-B14F-4D97-AF65-F5344CB8AC3E}">
-        <p14:creationId xmlns:p14="http://schemas.microsoft.com/office/powerpoint/2010/main" val="385104364"/>
-      </p:ext>
-    </p:extLst>
-  </p:cSld>
-  <p:clrMapOvr>
-    <a:masterClrMapping/>
-  </p:clrMapOvr>
-  <p:timing>
-    <p:tnLst>
-      <p:par>
-        <p:cTn xmlns:p14="http://schemas.microsoft.com/office/powerpoint/2010/main" id="1" dur="indefinite" restart="never" nodeType="tmRoot"/>
-      </p:par>
-    </p:tnLst>
-  </p:timing>
-</p:sld>
-</file>
-
-<file path=ppt/slides/slide40.xml><?xml version="1.0" encoding="utf-8"?>
+<file path=ppt/slides/slide39.xml><?xml version="1.0" encoding="utf-8"?>
 <p:sld xmlns:a="http://schemas.openxmlformats.org/drawingml/2006/main" xmlns:r="http://schemas.openxmlformats.org/officeDocument/2006/relationships" xmlns:p="http://schemas.openxmlformats.org/presentationml/2006/main">
   <p:cSld>
     <p:spTree>
@@ -19700,7 +19442,159 @@
 </p:sld>
 </file>
 
-<file path=ppt/slides/slide41.xml><?xml version="1.0" encoding="utf-8"?>
+<file path=ppt/slides/slide4.xml><?xml version="1.0" encoding="utf-8"?>
+<p:sld xmlns:a="http://schemas.openxmlformats.org/drawingml/2006/main" xmlns:r="http://schemas.openxmlformats.org/officeDocument/2006/relationships" xmlns:p="http://schemas.openxmlformats.org/presentationml/2006/main">
+  <p:cSld>
+    <p:spTree>
+      <p:nvGrpSpPr>
+        <p:cNvPr id="1" name=""/>
+        <p:cNvGrpSpPr/>
+        <p:nvPr/>
+      </p:nvGrpSpPr>
+      <p:grpSpPr>
+        <a:xfrm>
+          <a:off x="0" y="0"/>
+          <a:ext cx="0" cy="0"/>
+          <a:chOff x="0" y="0"/>
+          <a:chExt cx="0" cy="0"/>
+        </a:xfrm>
+      </p:grpSpPr>
+      <p:sp>
+        <p:nvSpPr>
+          <p:cNvPr id="2" name="Title 1"/>
+          <p:cNvSpPr>
+            <a:spLocks noGrp="1"/>
+          </p:cNvSpPr>
+          <p:nvPr>
+            <p:ph type="title"/>
+          </p:nvPr>
+        </p:nvSpPr>
+        <p:spPr/>
+        <p:txBody>
+          <a:bodyPr/>
+          <a:lstStyle/>
+          <a:p>
+            <a:r>
+              <a:rPr lang="en-US" dirty="0" smtClean="0"/>
+              <a:t>Somatic </a:t>
+            </a:r>
+            <a:r>
+              <a:rPr lang="en-US" dirty="0" err="1" smtClean="0"/>
+              <a:t>vs</a:t>
+            </a:r>
+            <a:r>
+              <a:rPr lang="en-US" dirty="0" smtClean="0"/>
+              <a:t> </a:t>
+            </a:r>
+            <a:r>
+              <a:rPr lang="en-US" dirty="0" err="1" smtClean="0"/>
+              <a:t>germline</a:t>
+            </a:r>
+            <a:r>
+              <a:rPr lang="en-US" dirty="0" smtClean="0"/>
+              <a:t> mutations</a:t>
+            </a:r>
+            <a:endParaRPr lang="en-US" dirty="0"/>
+          </a:p>
+        </p:txBody>
+      </p:sp>
+      <p:pic>
+        <p:nvPicPr>
+          <p:cNvPr id="8" name="Picture 7" descr="hosp-misc-ipactr6-1101.gif"/>
+          <p:cNvPicPr>
+            <a:picLocks noChangeAspect="1"/>
+          </p:cNvPicPr>
+          <p:nvPr/>
+        </p:nvPicPr>
+        <p:blipFill>
+          <a:blip r:embed="rId2">
+            <a:extLst>
+              <a:ext uri="{28A0092B-C50C-407E-A947-70E740481C1C}">
+                <a14:useLocalDpi xmlns:a14="http://schemas.microsoft.com/office/drawing/2010/main" val="0"/>
+              </a:ext>
+            </a:extLst>
+          </a:blip>
+          <a:stretch>
+            <a:fillRect/>
+          </a:stretch>
+        </p:blipFill>
+        <p:spPr>
+          <a:xfrm>
+            <a:off x="1714500" y="1793909"/>
+            <a:ext cx="5715000" cy="4318000"/>
+          </a:xfrm>
+          <a:prstGeom prst="rect">
+            <a:avLst/>
+          </a:prstGeom>
+        </p:spPr>
+      </p:pic>
+      <p:sp>
+        <p:nvSpPr>
+          <p:cNvPr id="9" name="Rectangle 8"/>
+          <p:cNvSpPr/>
+          <p:nvPr/>
+        </p:nvSpPr>
+        <p:spPr>
+          <a:xfrm>
+            <a:off x="2572837" y="5955787"/>
+            <a:ext cx="4161693" cy="461665"/>
+          </a:xfrm>
+          <a:prstGeom prst="rect">
+            <a:avLst/>
+          </a:prstGeom>
+          <a:solidFill>
+            <a:schemeClr val="bg1"/>
+          </a:solidFill>
+        </p:spPr>
+        <p:txBody>
+          <a:bodyPr wrap="square">
+            <a:spAutoFit/>
+          </a:bodyPr>
+          <a:lstStyle/>
+          <a:p>
+            <a:endParaRPr lang="en-US" sz="1200" dirty="0" smtClean="0"/>
+          </a:p>
+          <a:p>
+            <a:r>
+              <a:rPr lang="en-US" sz="1200" dirty="0" smtClean="0"/>
+              <a:t>https</a:t>
+            </a:r>
+            <a:r>
+              <a:rPr lang="en-US" sz="1200" dirty="0"/>
+              <a:t>://</a:t>
+            </a:r>
+            <a:r>
+              <a:rPr lang="en-US" sz="1200" dirty="0" err="1"/>
+              <a:t>www.stjude.org</a:t>
+            </a:r>
+            <a:r>
+              <a:rPr lang="en-US" sz="1200" dirty="0"/>
+              <a:t>/Images/hosp-misc-ipactr6-1101.gif</a:t>
+            </a:r>
+          </a:p>
+        </p:txBody>
+      </p:sp>
+    </p:spTree>
+    <p:extLst>
+      <p:ext uri="{BB962C8B-B14F-4D97-AF65-F5344CB8AC3E}">
+        <p14:creationId xmlns:p14="http://schemas.microsoft.com/office/powerpoint/2010/main" val="385104364"/>
+      </p:ext>
+    </p:extLst>
+  </p:cSld>
+  <p:clrMapOvr>
+    <a:masterClrMapping/>
+  </p:clrMapOvr>
+  <p:timing>
+    <p:tnLst>
+      <p:par>
+        <p:cTn xmlns:p14="http://schemas.microsoft.com/office/powerpoint/2010/main" id="1" dur="indefinite" restart="never" nodeType="tmRoot"/>
+      </p:par>
+    </p:tnLst>
+  </p:timing>
+</p:sld>
+</file>
+
+<file path=ppt/slides/slide40.xml><?xml version="1.0" encoding="utf-8"?>
 <p:sld xmlns:a="http://schemas.openxmlformats.org/drawingml/2006/main" xmlns:r="http://schemas.openxmlformats.org/officeDocument/2006/relationships" xmlns:p="http://schemas.openxmlformats.org/presentationml/2006/main">
   <p:cSld>
     <p:spTree>
@@ -19734,14 +19628,18 @@
           </a:xfrm>
         </p:spPr>
         <p:txBody>
-          <a:bodyPr/>
+          <a:bodyPr>
+            <a:normAutofit/>
+          </a:bodyPr>
           <a:lstStyle/>
           <a:p>
             <a:r>
-              <a:rPr lang="en-US" dirty="0" smtClean="0"/>
-              <a:t>Questions?</a:t>
-            </a:r>
-            <a:endParaRPr lang="en-US" dirty="0"/>
+              <a:rPr lang="en-US" sz="3200" u="sng" dirty="0">
+                <a:hlinkClick r:id="rId2"/>
+              </a:rPr>
+              <a:t>http://scilifelab.github.io/courses/ngsgu/cancergenomics/1610/ </a:t>
+            </a:r>
+            <a:endParaRPr lang="en-US" sz="3200" dirty="0"/>
           </a:p>
         </p:txBody>
       </p:sp>
@@ -19975,7 +19873,23 @@
             </a:r>
             <a:r>
               <a:rPr lang="en-US" sz="1400" i="0" baseline="0" dirty="0"/>
-              <a:t> illustration encompasses the six hallmark capabilities originally proposed in our 2000 perspective. The past decade has witnessed remarkable progress toward understanding the mechanistic underpinnings of each hallmark</a:t>
+              <a:t> illustration encompasses the six hallmark capabilities originally proposed </a:t>
+            </a:r>
+            <a:r>
+              <a:rPr lang="en-US" sz="1400" i="0" baseline="0" dirty="0" smtClean="0"/>
+              <a:t>by </a:t>
+            </a:r>
+            <a:r>
+              <a:rPr lang="en-US" sz="1400" i="0" baseline="0" dirty="0" err="1" smtClean="0"/>
+              <a:t>Hanahan</a:t>
+            </a:r>
+            <a:r>
+              <a:rPr lang="en-US" sz="1400" i="0" baseline="0" dirty="0" smtClean="0"/>
+              <a:t> et al 2000. </a:t>
+            </a:r>
+            <a:r>
+              <a:rPr lang="en-US" sz="1400" i="0" baseline="0" dirty="0"/>
+              <a:t>The past decade has witnessed remarkable progress toward understanding the mechanistic underpinnings of each hallmark</a:t>
             </a:r>
             <a:r>
               <a:rPr lang="en-US" sz="1400" i="0" baseline="0" dirty="0" smtClean="0"/>

</xml_diff>